<commit_message>
Update course schedule displayed on WelcomePresentation
</commit_message>
<xml_diff>
--- a/Workshops/WelcomePresentation_inperson.pptx
+++ b/Workshops/WelcomePresentation_inperson.pptx
@@ -5,7 +5,7 @@
     <p:sldMasterId id="2147483648" r:id="rId1"/>
   </p:sldMasterIdLst>
   <p:notesMasterIdLst>
-    <p:NotesMasterId r:id="rId12"/>
+    <p:notesMasterId r:id="rId12"/>
   </p:notesMasterIdLst>
   <p:sldIdLst>
     <p:sldId id="256" r:id="rId2"/>
@@ -206,7 +206,7 @@
           <a:p>
             <a:fld id="{0F9C1CCF-B725-44A7-AA57-5E433BD85C9F}" type="datetimeFigureOut">
               <a:rPr lang="en-US" smtClean="0"/>
-              <a:t>4/5/2019</a:t>
+              <a:t>10/9/22</a:t>
             </a:fld>
             <a:endParaRPr lang="en-US"/>
           </a:p>
@@ -270,38 +270,37 @@
           <a:p>
             <a:pPr lvl="0"/>
             <a:r>
-              <a:rPr lang="en-US" smtClean="0"/>
+              <a:rPr lang="en-US"/>
               <a:t>Click to edit Master text styles</a:t>
             </a:r>
           </a:p>
           <a:p>
             <a:pPr lvl="1"/>
             <a:r>
-              <a:rPr lang="en-US" smtClean="0"/>
+              <a:rPr lang="en-US"/>
               <a:t>Second level</a:t>
             </a:r>
           </a:p>
           <a:p>
             <a:pPr lvl="2"/>
             <a:r>
-              <a:rPr lang="en-US" smtClean="0"/>
+              <a:rPr lang="en-US"/>
               <a:t>Third level</a:t>
             </a:r>
           </a:p>
           <a:p>
             <a:pPr lvl="3"/>
             <a:r>
-              <a:rPr lang="en-US" smtClean="0"/>
+              <a:rPr lang="en-US"/>
               <a:t>Fourth level</a:t>
             </a:r>
           </a:p>
           <a:p>
             <a:pPr lvl="4"/>
             <a:r>
-              <a:rPr lang="en-US" smtClean="0"/>
+              <a:rPr lang="en-US"/>
               <a:t>Fifth level</a:t>
             </a:r>
-            <a:endParaRPr lang="en-US"/>
           </a:p>
         </p:txBody>
       </p:sp>
@@ -518,164 +517,11 @@
           <a:bodyPr/>
           <a:lstStyle/>
           <a:p>
-            <a:pPr lvl="0" marL="0" indent="0">
+            <a:pPr marL="0" lvl="0" indent="0">
               <a:buNone/>
             </a:pPr>
             <a:r>
-              <a:rPr/>
-              <a:t>Say</a:t>
-            </a:r>
-            <a:r>
-              <a:rPr/>
-              <a:t> </a:t>
-            </a:r>
-            <a:r>
-              <a:rPr/>
-              <a:t>that</a:t>
-            </a:r>
-            <a:r>
-              <a:rPr/>
-              <a:t> </a:t>
-            </a:r>
-            <a:r>
-              <a:rPr/>
-              <a:t>this</a:t>
-            </a:r>
-            <a:r>
-              <a:rPr/>
-              <a:t> </a:t>
-            </a:r>
-            <a:r>
-              <a:rPr/>
-              <a:t>is</a:t>
-            </a:r>
-            <a:r>
-              <a:rPr/>
-              <a:t> </a:t>
-            </a:r>
-            <a:r>
-              <a:rPr/>
-              <a:t>a</a:t>
-            </a:r>
-            <a:r>
-              <a:rPr/>
-              <a:t> </a:t>
-            </a:r>
-            <a:r>
-              <a:rPr/>
-              <a:t>quick</a:t>
-            </a:r>
-            <a:r>
-              <a:rPr/>
-              <a:t> </a:t>
-            </a:r>
-            <a:r>
-              <a:rPr/>
-              <a:t>intro</a:t>
-            </a:r>
-            <a:r>
-              <a:rPr/>
-              <a:t> </a:t>
-            </a:r>
-            <a:r>
-              <a:rPr/>
-              <a:t>to</a:t>
-            </a:r>
-            <a:r>
-              <a:rPr/>
-              <a:t> </a:t>
-            </a:r>
-            <a:r>
-              <a:rPr/>
-              <a:t>the</a:t>
-            </a:r>
-            <a:r>
-              <a:rPr/>
-              <a:t> </a:t>
-            </a:r>
-            <a:r>
-              <a:rPr/>
-              <a:t>course.</a:t>
-            </a:r>
-            <a:r>
-              <a:rPr/>
-              <a:t> </a:t>
-            </a:r>
-            <a:r>
-              <a:rPr/>
-              <a:t>And</a:t>
-            </a:r>
-            <a:r>
-              <a:rPr/>
-              <a:t> </a:t>
-            </a:r>
-            <a:r>
-              <a:rPr/>
-              <a:t>that</a:t>
-            </a:r>
-            <a:r>
-              <a:rPr/>
-              <a:t> </a:t>
-            </a:r>
-            <a:r>
-              <a:rPr/>
-              <a:t>this</a:t>
-            </a:r>
-            <a:r>
-              <a:rPr/>
-              <a:t> </a:t>
-            </a:r>
-            <a:r>
-              <a:rPr/>
-              <a:t>is</a:t>
-            </a:r>
-            <a:r>
-              <a:rPr/>
-              <a:t> </a:t>
-            </a:r>
-            <a:r>
-              <a:rPr/>
-              <a:t>what</a:t>
-            </a:r>
-            <a:r>
-              <a:rPr/>
-              <a:t> </a:t>
-            </a:r>
-            <a:r>
-              <a:rPr/>
-              <a:t>we</a:t>
-            </a:r>
-            <a:r>
-              <a:rPr/>
-              <a:t> </a:t>
-            </a:r>
-            <a:r>
-              <a:rPr/>
-              <a:t>cover</a:t>
-            </a:r>
-            <a:r>
-              <a:rPr/>
-              <a:t> </a:t>
-            </a:r>
-            <a:r>
-              <a:rPr/>
-              <a:t>during</a:t>
-            </a:r>
-            <a:r>
-              <a:rPr/>
-              <a:t> </a:t>
-            </a:r>
-            <a:r>
-              <a:rPr/>
-              <a:t>this</a:t>
-            </a:r>
-            <a:r>
-              <a:rPr/>
-              <a:t> </a:t>
-            </a:r>
-            <a:r>
-              <a:rPr/>
-              <a:t>intro.</a:t>
+              <a:t>Say that this is a quick intro to the course. And that this is what we cover during this intro.</a:t>
             </a:r>
           </a:p>
         </p:txBody>
@@ -705,6 +551,9 @@
       </p:sp>
     </p:spTree>
   </p:cSld>
+  <p:clrMapOvr>
+    <a:masterClrMapping/>
+  </p:clrMapOvr>
 </p:notes>
 </file>
 
@@ -752,372 +601,11 @@
           <a:bodyPr/>
           <a:lstStyle/>
           <a:p>
-            <a:pPr lvl="0" marL="0" indent="0">
+            <a:pPr marL="0" lvl="0" indent="0">
               <a:buNone/>
             </a:pPr>
             <a:r>
-              <a:rPr/>
-              <a:t>Go</a:t>
-            </a:r>
-            <a:r>
-              <a:rPr/>
-              <a:t> </a:t>
-            </a:r>
-            <a:r>
-              <a:rPr/>
-              <a:t>through</a:t>
-            </a:r>
-            <a:r>
-              <a:rPr/>
-              <a:t> </a:t>
-            </a:r>
-            <a:r>
-              <a:rPr/>
-              <a:t>each</a:t>
-            </a:r>
-            <a:r>
-              <a:rPr/>
-              <a:t> </a:t>
-            </a:r>
-            <a:r>
-              <a:rPr/>
-              <a:t>item</a:t>
-            </a:r>
-            <a:r>
-              <a:rPr/>
-              <a:t> </a:t>
-            </a:r>
-            <a:r>
-              <a:rPr/>
-              <a:t>on</a:t>
-            </a:r>
-            <a:r>
-              <a:rPr/>
-              <a:t> </a:t>
-            </a:r>
-            <a:r>
-              <a:rPr/>
-              <a:t>list,</a:t>
-            </a:r>
-            <a:r>
-              <a:rPr/>
-              <a:t> </a:t>
-            </a:r>
-            <a:r>
-              <a:rPr/>
-              <a:t>make</a:t>
-            </a:r>
-            <a:r>
-              <a:rPr/>
-              <a:t> </a:t>
-            </a:r>
-            <a:r>
-              <a:rPr/>
-              <a:t>sure</a:t>
-            </a:r>
-            <a:r>
-              <a:rPr/>
-              <a:t> </a:t>
-            </a:r>
-            <a:r>
-              <a:rPr/>
-              <a:t>each</a:t>
-            </a:r>
-            <a:r>
-              <a:rPr/>
-              <a:t> </a:t>
-            </a:r>
-            <a:r>
-              <a:rPr/>
-              <a:t>person</a:t>
-            </a:r>
-            <a:r>
-              <a:rPr/>
-              <a:t> </a:t>
-            </a:r>
-            <a:r>
-              <a:rPr/>
-              <a:t>has</a:t>
-            </a:r>
-            <a:r>
-              <a:rPr/>
-              <a:t> </a:t>
-            </a:r>
-            <a:r>
-              <a:rPr/>
-              <a:t>completed</a:t>
-            </a:r>
-            <a:r>
-              <a:rPr/>
-              <a:t> </a:t>
-            </a:r>
-            <a:r>
-              <a:rPr/>
-              <a:t>all</a:t>
-            </a:r>
-            <a:r>
-              <a:rPr/>
-              <a:t> </a:t>
-            </a:r>
-            <a:r>
-              <a:rPr/>
-              <a:t>items.</a:t>
-            </a:r>
-            <a:r>
-              <a:rPr/>
-              <a:t> </a:t>
-            </a:r>
-            <a:r>
-              <a:rPr/>
-              <a:t>You</a:t>
-            </a:r>
-            <a:r>
-              <a:rPr/>
-              <a:t> </a:t>
-            </a:r>
-            <a:r>
-              <a:rPr/>
-              <a:t>can</a:t>
-            </a:r>
-            <a:r>
-              <a:rPr/>
-              <a:t> </a:t>
-            </a:r>
-            <a:r>
-              <a:rPr/>
-              <a:t>spend</a:t>
-            </a:r>
-            <a:r>
-              <a:rPr/>
-              <a:t> </a:t>
-            </a:r>
-            <a:r>
-              <a:rPr/>
-              <a:t>some</a:t>
-            </a:r>
-            <a:r>
-              <a:rPr/>
-              <a:t> </a:t>
-            </a:r>
-            <a:r>
-              <a:rPr/>
-              <a:t>time</a:t>
-            </a:r>
-            <a:r>
-              <a:rPr/>
-              <a:t> </a:t>
-            </a:r>
-            <a:r>
-              <a:rPr/>
-              <a:t>on</a:t>
-            </a:r>
-            <a:r>
-              <a:rPr/>
-              <a:t> </a:t>
-            </a:r>
-            <a:r>
-              <a:rPr/>
-              <a:t>this</a:t>
-            </a:r>
-            <a:r>
-              <a:rPr/>
-              <a:t> </a:t>
-            </a:r>
-            <a:r>
-              <a:rPr/>
-              <a:t>slide.</a:t>
-            </a:r>
-            <a:r>
-              <a:rPr/>
-              <a:t> </a:t>
-            </a:r>
-            <a:r>
-              <a:rPr/>
-              <a:t>Tell</a:t>
-            </a:r>
-            <a:r>
-              <a:rPr/>
-              <a:t> </a:t>
-            </a:r>
-            <a:r>
-              <a:rPr/>
-              <a:t>people</a:t>
-            </a:r>
-            <a:r>
-              <a:rPr/>
-              <a:t> </a:t>
-            </a:r>
-            <a:r>
-              <a:rPr/>
-              <a:t>that</a:t>
-            </a:r>
-            <a:r>
-              <a:rPr/>
-              <a:t> </a:t>
-            </a:r>
-            <a:r>
-              <a:rPr/>
-              <a:t>they</a:t>
-            </a:r>
-            <a:r>
-              <a:rPr/>
-              <a:t> </a:t>
-            </a:r>
-            <a:r>
-              <a:rPr/>
-              <a:t>can</a:t>
-            </a:r>
-            <a:r>
-              <a:rPr/>
-              <a:t> </a:t>
-            </a:r>
-            <a:r>
-              <a:rPr/>
-              <a:t>sign</a:t>
-            </a:r>
-            <a:r>
-              <a:rPr/>
-              <a:t> </a:t>
-            </a:r>
-            <a:r>
-              <a:rPr/>
-              <a:t>the</a:t>
-            </a:r>
-            <a:r>
-              <a:rPr/>
-              <a:t> </a:t>
-            </a:r>
-            <a:r>
-              <a:rPr/>
-              <a:t>CCHIC</a:t>
-            </a:r>
-            <a:r>
-              <a:rPr/>
-              <a:t> </a:t>
-            </a:r>
-            <a:r>
-              <a:rPr/>
-              <a:t>user</a:t>
-            </a:r>
-            <a:r>
-              <a:rPr/>
-              <a:t> </a:t>
-            </a:r>
-            <a:r>
-              <a:rPr/>
-              <a:t>sharing</a:t>
-            </a:r>
-            <a:r>
-              <a:rPr/>
-              <a:t> </a:t>
-            </a:r>
-            <a:r>
-              <a:rPr/>
-              <a:t>agreement</a:t>
-            </a:r>
-            <a:r>
-              <a:rPr/>
-              <a:t> </a:t>
-            </a:r>
-            <a:r>
-              <a:rPr/>
-              <a:t>if</a:t>
-            </a:r>
-            <a:r>
-              <a:rPr/>
-              <a:t> </a:t>
-            </a:r>
-            <a:r>
-              <a:rPr/>
-              <a:t>they</a:t>
-            </a:r>
-            <a:r>
-              <a:rPr/>
-              <a:t> </a:t>
-            </a:r>
-            <a:r>
-              <a:rPr/>
-              <a:t>want</a:t>
-            </a:r>
-            <a:r>
-              <a:rPr/>
-              <a:t> </a:t>
-            </a:r>
-            <a:r>
-              <a:rPr/>
-              <a:t>to</a:t>
-            </a:r>
-            <a:r>
-              <a:rPr/>
-              <a:t> </a:t>
-            </a:r>
-            <a:r>
-              <a:rPr/>
-              <a:t>access</a:t>
-            </a:r>
-            <a:r>
-              <a:rPr/>
-              <a:t> </a:t>
-            </a:r>
-            <a:r>
-              <a:rPr/>
-              <a:t>the</a:t>
-            </a:r>
-            <a:r>
-              <a:rPr/>
-              <a:t> </a:t>
-            </a:r>
-            <a:r>
-              <a:rPr/>
-              <a:t>full</a:t>
-            </a:r>
-            <a:r>
-              <a:rPr/>
-              <a:t> </a:t>
-            </a:r>
-            <a:r>
-              <a:rPr/>
-              <a:t>public</a:t>
-            </a:r>
-            <a:r>
-              <a:rPr/>
-              <a:t> </a:t>
-            </a:r>
-            <a:r>
-              <a:rPr/>
-              <a:t>dataset</a:t>
-            </a:r>
-            <a:r>
-              <a:rPr/>
-              <a:t> </a:t>
-            </a:r>
-            <a:r>
-              <a:rPr/>
-              <a:t>to</a:t>
-            </a:r>
-            <a:r>
-              <a:rPr/>
-              <a:t> </a:t>
-            </a:r>
-            <a:r>
-              <a:rPr/>
-              <a:t>play</a:t>
-            </a:r>
-            <a:r>
-              <a:rPr/>
-              <a:t> </a:t>
-            </a:r>
-            <a:r>
-              <a:rPr/>
-              <a:t>with</a:t>
-            </a:r>
-            <a:r>
-              <a:rPr/>
-              <a:t> </a:t>
-            </a:r>
-            <a:r>
-              <a:rPr/>
-              <a:t>later.</a:t>
+              <a:t>Go through each item on list, make sure each person has completed all items. You can spend some time on this slide. Tell people that they can sign the CCHIC user sharing agreement if they want to access the full public dataset to play with later.</a:t>
             </a:r>
           </a:p>
         </p:txBody>
@@ -1147,6 +635,9 @@
       </p:sp>
     </p:spTree>
   </p:cSld>
+  <p:clrMapOvr>
+    <a:masterClrMapping/>
+  </p:clrMapOvr>
 </p:notes>
 </file>
 
@@ -1177,7 +668,12 @@
             <p:ph type="sldImg"/>
           </p:nvPr>
         </p:nvSpPr>
-        <p:spPr/>
+        <p:spPr>
+          <a:xfrm>
+            <a:off x="685800" y="1143000"/>
+            <a:ext cx="5486400" cy="3086100"/>
+          </a:xfrm>
+        </p:spPr>
       </p:sp>
       <p:sp>
         <p:nvSpPr>
@@ -1194,28 +690,11 @@
           <a:bodyPr/>
           <a:lstStyle/>
           <a:p>
-            <a:pPr lvl="0" marL="0" indent="0">
+            <a:pPr marL="0" lvl="0" indent="0">
               <a:buNone/>
             </a:pPr>
             <a:r>
-              <a:rPr/>
-              <a:t>Lunch</a:t>
-            </a:r>
-            <a:r>
-              <a:rPr/>
-              <a:t> </a:t>
-            </a:r>
-            <a:r>
-              <a:rPr/>
-              <a:t>is</a:t>
-            </a:r>
-            <a:r>
-              <a:rPr/>
-              <a:t> </a:t>
-            </a:r>
-            <a:r>
-              <a:rPr/>
-              <a:t>provided</a:t>
+              <a:t>Lunch is provided</a:t>
             </a:r>
           </a:p>
         </p:txBody>
@@ -1245,6 +724,9 @@
       </p:sp>
     </p:spTree>
   </p:cSld>
+  <p:clrMapOvr>
+    <a:masterClrMapping/>
+  </p:clrMapOvr>
 </p:notes>
 </file>
 
@@ -1395,7 +877,7 @@
           <a:p>
             <a:fld id="{937E6D32-4C03-264D-8FDB-034DA7582E3B}" type="datetimeFigureOut">
               <a:rPr lang="en-US" smtClean="0"/>
-              <a:t>9/21/2021</a:t>
+              <a:t>10/9/22</a:t>
             </a:fld>
             <a:endParaRPr lang="en-US"/>
           </a:p>
@@ -1593,7 +1075,7 @@
           <a:p>
             <a:fld id="{937E6D32-4C03-264D-8FDB-034DA7582E3B}" type="datetimeFigureOut">
               <a:rPr lang="en-US" smtClean="0"/>
-              <a:t>9/21/2021</a:t>
+              <a:t>10/9/22</a:t>
             </a:fld>
             <a:endParaRPr lang="en-US"/>
           </a:p>
@@ -1801,7 +1283,7 @@
           <a:p>
             <a:fld id="{937E6D32-4C03-264D-8FDB-034DA7582E3B}" type="datetimeFigureOut">
               <a:rPr lang="en-US" smtClean="0"/>
-              <a:t>9/21/2021</a:t>
+              <a:t>10/9/22</a:t>
             </a:fld>
             <a:endParaRPr lang="en-US"/>
           </a:p>
@@ -1999,7 +1481,7 @@
           <a:p>
             <a:fld id="{937E6D32-4C03-264D-8FDB-034DA7582E3B}" type="datetimeFigureOut">
               <a:rPr lang="en-US" smtClean="0"/>
-              <a:t>9/21/2021</a:t>
+              <a:t>10/9/22</a:t>
             </a:fld>
             <a:endParaRPr lang="en-US"/>
           </a:p>
@@ -2274,7 +1756,7 @@
           <a:p>
             <a:fld id="{937E6D32-4C03-264D-8FDB-034DA7582E3B}" type="datetimeFigureOut">
               <a:rPr lang="en-US" smtClean="0"/>
-              <a:t>9/21/2021</a:t>
+              <a:t>10/9/22</a:t>
             </a:fld>
             <a:endParaRPr lang="en-US"/>
           </a:p>
@@ -2539,7 +2021,7 @@
           <a:p>
             <a:fld id="{937E6D32-4C03-264D-8FDB-034DA7582E3B}" type="datetimeFigureOut">
               <a:rPr lang="en-US" smtClean="0"/>
-              <a:t>9/21/2021</a:t>
+              <a:t>10/9/22</a:t>
             </a:fld>
             <a:endParaRPr lang="en-US"/>
           </a:p>
@@ -2951,7 +2433,7 @@
           <a:p>
             <a:fld id="{937E6D32-4C03-264D-8FDB-034DA7582E3B}" type="datetimeFigureOut">
               <a:rPr lang="en-US" smtClean="0"/>
-              <a:t>9/21/2021</a:t>
+              <a:t>10/9/22</a:t>
             </a:fld>
             <a:endParaRPr lang="en-US"/>
           </a:p>
@@ -3092,7 +2574,7 @@
           <a:p>
             <a:fld id="{937E6D32-4C03-264D-8FDB-034DA7582E3B}" type="datetimeFigureOut">
               <a:rPr lang="en-US" smtClean="0"/>
-              <a:t>9/21/2021</a:t>
+              <a:t>10/9/22</a:t>
             </a:fld>
             <a:endParaRPr lang="en-US"/>
           </a:p>
@@ -3205,7 +2687,7 @@
           <a:p>
             <a:fld id="{937E6D32-4C03-264D-8FDB-034DA7582E3B}" type="datetimeFigureOut">
               <a:rPr lang="en-US" smtClean="0"/>
-              <a:t>9/21/2021</a:t>
+              <a:t>10/9/22</a:t>
             </a:fld>
             <a:endParaRPr lang="en-US"/>
           </a:p>
@@ -3516,7 +2998,7 @@
           <a:p>
             <a:fld id="{937E6D32-4C03-264D-8FDB-034DA7582E3B}" type="datetimeFigureOut">
               <a:rPr lang="en-US" smtClean="0"/>
-              <a:t>9/21/2021</a:t>
+              <a:t>10/9/22</a:t>
             </a:fld>
             <a:endParaRPr lang="en-US"/>
           </a:p>
@@ -3804,7 +3286,7 @@
           <a:p>
             <a:fld id="{937E6D32-4C03-264D-8FDB-034DA7582E3B}" type="datetimeFigureOut">
               <a:rPr lang="en-US" smtClean="0"/>
-              <a:t>9/21/2021</a:t>
+              <a:t>10/9/22</a:t>
             </a:fld>
             <a:endParaRPr lang="en-US"/>
           </a:p>
@@ -4045,7 +3527,7 @@
           <a:p>
             <a:fld id="{937E6D32-4C03-264D-8FDB-034DA7582E3B}" type="datetimeFigureOut">
               <a:rPr lang="en-US" smtClean="0"/>
-              <a:t>9/21/2021</a:t>
+              <a:t>10/9/22</a:t>
             </a:fld>
             <a:endParaRPr lang="en-US"/>
           </a:p>
@@ -4488,36 +3970,11 @@
           <a:bodyPr/>
           <a:lstStyle/>
           <a:p>
-            <a:pPr lvl="0" marL="0" indent="0">
+            <a:pPr marL="0" lvl="0" indent="0">
               <a:buNone/>
             </a:pPr>
             <a:r>
-              <a:rPr/>
-              <a:t>Welcome</a:t>
-            </a:r>
-            <a:r>
-              <a:rPr/>
-              <a:t> </a:t>
-            </a:r>
-            <a:r>
-              <a:rPr/>
-              <a:t>to</a:t>
-            </a:r>
-            <a:r>
-              <a:rPr/>
-              <a:t> </a:t>
-            </a:r>
-            <a:r>
-              <a:rPr/>
-              <a:t>Clinician</a:t>
-            </a:r>
-            <a:r>
-              <a:rPr/>
-              <a:t> </a:t>
-            </a:r>
-            <a:r>
-              <a:rPr/>
-              <a:t>Coders</a:t>
+              <a:t>Welcome to Clinician Coders</a:t>
             </a:r>
           </a:p>
         </p:txBody>
@@ -4548,16 +4005,20 @@
           <a:bodyPr/>
           <a:lstStyle/>
           <a:p>
-            <a:pPr lvl="0" marL="0" indent="0">
+            <a:pPr marL="0" lvl="0" indent="0">
               <a:buNone/>
             </a:pPr>
             <a:br/>
             <a:br/>
+            <a:endParaRPr/>
           </a:p>
         </p:txBody>
       </p:sp>
     </p:spTree>
   </p:cSld>
+  <p:clrMapOvr>
+    <a:masterClrMapping/>
+  </p:clrMapOvr>
 </p:sld>
 </file>
 
@@ -4604,74 +4065,21 @@
           <a:bodyPr/>
           <a:lstStyle/>
           <a:p>
-            <a:pPr lvl="0" marL="0" indent="0">
+            <a:pPr marL="0" lvl="0" indent="0">
               <a:buNone/>
             </a:pPr>
             <a:r>
               <a:rPr b="1"/>
-              <a:t>Thank</a:t>
-            </a:r>
-            <a:r>
-              <a:rPr b="1"/>
-              <a:t> </a:t>
-            </a:r>
-            <a:r>
-              <a:rPr b="1"/>
-              <a:t>you.</a:t>
-            </a:r>
-            <a:r>
-              <a:rPr b="1"/>
-              <a:t> </a:t>
-            </a:r>
-            <a:r>
-              <a:rPr b="1"/>
-              <a:t>We</a:t>
-            </a:r>
-            <a:r>
-              <a:rPr b="1"/>
-              <a:t> </a:t>
-            </a:r>
-            <a:r>
-              <a:rPr b="1"/>
-              <a:t>hope</a:t>
-            </a:r>
-            <a:r>
-              <a:rPr b="1"/>
-              <a:t> </a:t>
-            </a:r>
-            <a:r>
-              <a:rPr b="1"/>
-              <a:t>you</a:t>
-            </a:r>
-            <a:r>
-              <a:rPr b="1"/>
-              <a:t> </a:t>
-            </a:r>
-            <a:r>
-              <a:rPr b="1"/>
-              <a:t>enjoy</a:t>
-            </a:r>
-            <a:r>
-              <a:rPr b="1"/>
-              <a:t> </a:t>
-            </a:r>
-            <a:r>
-              <a:rPr b="1"/>
-              <a:t>the</a:t>
-            </a:r>
-            <a:r>
-              <a:rPr b="1"/>
-              <a:t> </a:t>
-            </a:r>
-            <a:r>
-              <a:rPr b="1"/>
-              <a:t>course.</a:t>
+              <a:t>Thank you. We hope you enjoy the course.</a:t>
             </a:r>
           </a:p>
         </p:txBody>
       </p:sp>
     </p:spTree>
   </p:cSld>
+  <p:clrMapOvr>
+    <a:masterClrMapping/>
+  </p:clrMapOvr>
 </p:sld>
 </file>
 
@@ -4694,7 +4102,7 @@
       </p:grpSpPr>
       <p:pic>
         <p:nvPicPr>
-          <p:cNvPr descr="../Images/ClinicianCodersBranding_FINAL_CMYK_Colour.png" id="0" name="Picture 1"/>
+          <p:cNvPr id="2" name="Picture 1" descr="../Images/ClinicianCodersBranding_FINAL_CMYK_Colour.png"/>
           <p:cNvPicPr>
             <a:picLocks noGrp="1" noChangeAspect="1"/>
           </p:cNvPicPr>
@@ -4724,6 +4132,9 @@
       </p:pic>
     </p:spTree>
   </p:cSld>
+  <p:clrMapOvr>
+    <a:masterClrMapping/>
+  </p:clrMapOvr>
 </p:sld>
 </file>
 
@@ -4765,11 +4176,10 @@
           <a:bodyPr/>
           <a:lstStyle/>
           <a:p>
-            <a:pPr lvl="0" marL="0" indent="0">
+            <a:pPr marL="0" lvl="0" indent="0">
               <a:buNone/>
             </a:pPr>
             <a:r>
-              <a:rPr/>
               <a:t>Hello!</a:t>
             </a:r>
           </a:p>
@@ -4798,35 +4208,30 @@
           <a:p>
             <a:pPr lvl="1"/>
             <a:r>
-              <a:rPr/>
               <a:t>Pre-requisites</a:t>
             </a:r>
           </a:p>
           <a:p>
             <a:pPr lvl="1"/>
             <a:r>
-              <a:rPr/>
               <a:t>Course schedule</a:t>
             </a:r>
           </a:p>
           <a:p>
             <a:pPr lvl="1"/>
             <a:r>
-              <a:rPr/>
               <a:t>What to expect from the workshops</a:t>
             </a:r>
           </a:p>
           <a:p>
             <a:pPr lvl="2"/>
             <a:r>
-              <a:rPr/>
               <a:t>Data</a:t>
             </a:r>
           </a:p>
           <a:p>
             <a:pPr lvl="2"/>
             <a:r>
-              <a:rPr/>
               <a:t>Layout</a:t>
             </a:r>
           </a:p>
@@ -4834,6 +4239,9 @@
       </p:sp>
     </p:spTree>
   </p:cSld>
+  <p:clrMapOvr>
+    <a:masterClrMapping/>
+  </p:clrMapOvr>
 </p:sld>
 </file>
 
@@ -4875,11 +4283,10 @@
           <a:bodyPr/>
           <a:lstStyle/>
           <a:p>
-            <a:pPr lvl="0" marL="0" indent="0">
+            <a:pPr marL="0" lvl="0" indent="0">
               <a:buNone/>
             </a:pPr>
             <a:r>
-              <a:rPr/>
               <a:t>Pre-requisites</a:t>
             </a:r>
           </a:p>
@@ -4908,42 +4315,36 @@
           <a:p>
             <a:pPr lvl="1"/>
             <a:r>
-              <a:rPr/>
               <a:t>Charging facilities – where’s your nearest?</a:t>
             </a:r>
           </a:p>
           <a:p>
             <a:pPr lvl="1"/>
             <a:r>
-              <a:rPr/>
               <a:t>Access Wi-fi</a:t>
             </a:r>
           </a:p>
           <a:p>
             <a:pPr lvl="1"/>
             <a:r>
-              <a:rPr/>
               <a:t>Download R Studio</a:t>
             </a:r>
           </a:p>
           <a:p>
             <a:pPr lvl="1"/>
             <a:r>
-              <a:rPr/>
               <a:t>Have a spreadsheet program on your laptop</a:t>
             </a:r>
           </a:p>
           <a:p>
             <a:pPr lvl="1"/>
             <a:r>
-              <a:rPr/>
               <a:t>Join the Slack channel</a:t>
             </a:r>
           </a:p>
           <a:p>
             <a:pPr lvl="1"/>
             <a:r>
-              <a:rPr/>
               <a:t>Decide which dataset to use on the second day</a:t>
             </a:r>
           </a:p>
@@ -4951,6 +4352,9 @@
       </p:sp>
     </p:spTree>
   </p:cSld>
+  <p:clrMapOvr>
+    <a:masterClrMapping/>
+  </p:clrMapOvr>
 </p:sld>
 </file>
 
@@ -4992,36 +4396,12 @@
           <a:bodyPr/>
           <a:lstStyle/>
           <a:p>
-            <a:pPr lvl="0" marL="0" indent="0">
+            <a:pPr marL="0" lvl="0" indent="0">
               <a:buNone/>
             </a:pPr>
             <a:r>
-              <a:rPr/>
-              <a:t>Schedule</a:t>
-            </a:r>
-            <a:r>
-              <a:rPr/>
-              <a:t> </a:t>
-            </a:r>
-            <a:r>
-              <a:rPr/>
-              <a:t>-</a:t>
-            </a:r>
-            <a:r>
-              <a:rPr/>
-              <a:t> </a:t>
-            </a:r>
-            <a:r>
-              <a:rPr/>
-              <a:t>Day</a:t>
-            </a:r>
-            <a:r>
-              <a:rPr/>
-              <a:t> </a:t>
-            </a:r>
-            <a:r>
-              <a:rPr/>
-              <a:t>1</a:t>
+              <a:rPr dirty="0"/>
+              <a:t>Schedule - Day 1</a:t>
             </a:r>
           </a:p>
         </p:txBody>
@@ -5044,61 +4424,72 @@
         </p:nvSpPr>
         <p:spPr/>
         <p:txBody>
-          <a:bodyPr/>
-          <a:lstStyle/>
-          <a:p>
-            <a:pPr lvl="1"/>
-            <a:r>
-              <a:rPr/>
-              <a:t>09:00 - 09:30: Start and welcome</a:t>
-            </a:r>
-          </a:p>
-          <a:p>
-            <a:pPr lvl="1"/>
-            <a:r>
-              <a:rPr/>
-              <a:t>09:30 - 10:30: Workshop 1: Introduction to R</a:t>
-            </a:r>
-          </a:p>
-          <a:p>
-            <a:pPr lvl="1"/>
-            <a:r>
-              <a:rPr/>
-              <a:t>10:30 - 11:00: Coffee break</a:t>
-            </a:r>
-          </a:p>
-          <a:p>
-            <a:pPr lvl="1"/>
-            <a:r>
-              <a:rPr/>
-              <a:t>11:00 - 11:45: Workshop 2: Cleaning your dataset</a:t>
-            </a:r>
-          </a:p>
-          <a:p>
-            <a:pPr lvl="1"/>
-            <a:r>
-              <a:rPr/>
-              <a:t>11:45 - 13:00: Workshop 3: Getting your data into R</a:t>
-            </a:r>
-          </a:p>
-          <a:p>
-            <a:pPr lvl="1"/>
-            <a:r>
-              <a:rPr/>
-              <a:t>13:00 - 14:00: Lunch</a:t>
-            </a:r>
-          </a:p>
-          <a:p>
-            <a:pPr lvl="1"/>
-            <a:r>
-              <a:rPr/>
-              <a:t>14:00 - 16:30: Workshop 4: Data wrangling</a:t>
-            </a:r>
+          <a:bodyPr>
+            <a:normAutofit/>
+          </a:bodyPr>
+          <a:lstStyle/>
+          <a:p>
+            <a:pPr marL="457200" lvl="1" indent="0">
+              <a:lnSpc>
+                <a:spcPct val="100000"/>
+              </a:lnSpc>
+              <a:buNone/>
+            </a:pPr>
+            <a:r>
+              <a:rPr lang="en-GB" dirty="0"/>
+              <a:t>09:30 - 11:00: Workshop 1: Introduction to R</a:t>
+            </a:r>
+            <a:br>
+              <a:rPr lang="en-GB" dirty="0"/>
+            </a:br>
+            <a:r>
+              <a:rPr lang="en-GB" dirty="0"/>
+              <a:t>11:00 - 11:15: Coffee Break</a:t>
+            </a:r>
+            <a:br>
+              <a:rPr lang="en-GB" dirty="0"/>
+            </a:br>
+            <a:r>
+              <a:rPr lang="en-GB" dirty="0"/>
+              <a:t>11:15 - 12:00: Workshop 2: Cleaning your Dataset</a:t>
+            </a:r>
+            <a:br>
+              <a:rPr lang="en-GB" dirty="0"/>
+            </a:br>
+            <a:r>
+              <a:rPr lang="en-GB" dirty="0"/>
+              <a:t>12:00 - 13:00: Lunch break</a:t>
+            </a:r>
+            <a:br>
+              <a:rPr lang="en-GB" dirty="0"/>
+            </a:br>
+            <a:r>
+              <a:rPr lang="en-GB" dirty="0"/>
+              <a:t>13:00 - 14:15: Workshop 3: Getting your Data into R</a:t>
+            </a:r>
+            <a:br>
+              <a:rPr lang="en-GB" dirty="0"/>
+            </a:br>
+            <a:r>
+              <a:rPr lang="en-GB" dirty="0"/>
+              <a:t>14:15 - 14:30: Coffee Break</a:t>
+            </a:r>
+            <a:br>
+              <a:rPr lang="en-GB" dirty="0"/>
+            </a:br>
+            <a:r>
+              <a:rPr lang="en-GB" dirty="0"/>
+              <a:t>14:30 - 16:30: Workshop 4: Data Wrangling</a:t>
+            </a:r>
+            <a:endParaRPr dirty="0"/>
           </a:p>
         </p:txBody>
       </p:sp>
     </p:spTree>
   </p:cSld>
+  <p:clrMapOvr>
+    <a:masterClrMapping/>
+  </p:clrMapOvr>
 </p:sld>
 </file>
 
@@ -5140,36 +4531,12 @@
           <a:bodyPr/>
           <a:lstStyle/>
           <a:p>
-            <a:pPr lvl="0" marL="0" indent="0">
+            <a:pPr marL="0" lvl="0" indent="0">
               <a:buNone/>
             </a:pPr>
             <a:r>
-              <a:rPr/>
-              <a:t>Schedule</a:t>
-            </a:r>
-            <a:r>
-              <a:rPr/>
-              <a:t> </a:t>
-            </a:r>
-            <a:r>
-              <a:rPr/>
-              <a:t>-</a:t>
-            </a:r>
-            <a:r>
-              <a:rPr/>
-              <a:t> </a:t>
-            </a:r>
-            <a:r>
-              <a:rPr/>
-              <a:t>Day</a:t>
-            </a:r>
-            <a:r>
-              <a:rPr/>
-              <a:t> </a:t>
-            </a:r>
-            <a:r>
-              <a:rPr/>
-              <a:t>2</a:t>
+              <a:rPr dirty="0"/>
+              <a:t>Schedule - Day 2</a:t>
             </a:r>
           </a:p>
         </p:txBody>
@@ -5195,51 +4562,67 @@
           <a:bodyPr/>
           <a:lstStyle/>
           <a:p>
-            <a:pPr lvl="1"/>
-            <a:r>
-              <a:rPr/>
-              <a:t>09:30 - 11:20: Workshop 5: Data visualisation</a:t>
-            </a:r>
-          </a:p>
-          <a:p>
-            <a:pPr lvl="1"/>
-            <a:r>
-              <a:rPr/>
-              <a:t>11:20 - 11:40: Coffee break</a:t>
-            </a:r>
-          </a:p>
-          <a:p>
-            <a:pPr lvl="1"/>
-            <a:r>
-              <a:rPr/>
-              <a:t>11:40 - 12:20: Workshop 6: Statistics in R primer</a:t>
-            </a:r>
-          </a:p>
-          <a:p>
-            <a:pPr lvl="1"/>
-            <a:r>
-              <a:rPr/>
-              <a:t>12:20 - 13:30: Workshop 7: Control flow and looping</a:t>
-            </a:r>
-          </a:p>
-          <a:p>
-            <a:pPr lvl="1"/>
-            <a:r>
-              <a:rPr/>
-              <a:t>13:30 - 14:15: Lunch</a:t>
-            </a:r>
-          </a:p>
-          <a:p>
-            <a:pPr lvl="1"/>
-            <a:r>
-              <a:rPr/>
-              <a:t>14:15 - 16:00: Workshop 8: Using your own data</a:t>
-            </a:r>
+            <a:pPr marL="457200" lvl="1" indent="0">
+              <a:lnSpc>
+                <a:spcPct val="100000"/>
+              </a:lnSpc>
+              <a:buNone/>
+            </a:pPr>
+            <a:r>
+              <a:rPr lang="en-GB" dirty="0"/>
+              <a:t>09:00 - 10:30: Workshop 5: Data visualisation</a:t>
+            </a:r>
+            <a:br>
+              <a:rPr lang="en-GB" dirty="0"/>
+            </a:br>
+            <a:r>
+              <a:rPr lang="en-GB" dirty="0"/>
+              <a:t>10:30 - 10:45: Coffee break</a:t>
+            </a:r>
+            <a:br>
+              <a:rPr lang="en-GB" dirty="0"/>
+            </a:br>
+            <a:r>
+              <a:rPr lang="en-GB" dirty="0"/>
+              <a:t>10:45 - 12:00: Workshop 6: Control flow and looping (part 1)</a:t>
+            </a:r>
+            <a:br>
+              <a:rPr lang="en-GB" dirty="0"/>
+            </a:br>
+            <a:r>
+              <a:rPr lang="en-GB" dirty="0"/>
+              <a:t>12:00 - 13:00: Lunch break</a:t>
+            </a:r>
+            <a:br>
+              <a:rPr lang="en-GB" dirty="0"/>
+            </a:br>
+            <a:r>
+              <a:rPr lang="en-GB" dirty="0"/>
+              <a:t>13:00 - 13:45: Workshop 6: Control flow and looping (part 2)</a:t>
+            </a:r>
+            <a:br>
+              <a:rPr lang="en-GB" dirty="0"/>
+            </a:br>
+            <a:r>
+              <a:rPr lang="en-GB" dirty="0"/>
+              <a:t>13:45 - 14:00: Coffee break</a:t>
+            </a:r>
+            <a:br>
+              <a:rPr lang="en-GB" dirty="0"/>
+            </a:br>
+            <a:r>
+              <a:rPr lang="en-GB" dirty="0"/>
+              <a:t>14:00 - 16:00: Workshop 7: Using your own data</a:t>
+            </a:r>
+            <a:endParaRPr dirty="0"/>
           </a:p>
         </p:txBody>
       </p:sp>
     </p:spTree>
   </p:cSld>
+  <p:clrMapOvr>
+    <a:masterClrMapping/>
+  </p:clrMapOvr>
 </p:sld>
 </file>
 
@@ -5281,20 +4664,11 @@
           <a:bodyPr/>
           <a:lstStyle/>
           <a:p>
-            <a:pPr lvl="0" marL="0" indent="0">
+            <a:pPr marL="0" lvl="0" indent="0">
               <a:buNone/>
             </a:pPr>
             <a:r>
-              <a:rPr/>
-              <a:t>The</a:t>
-            </a:r>
-            <a:r>
-              <a:rPr/>
-              <a:t> </a:t>
-            </a:r>
-            <a:r>
-              <a:rPr/>
-              <a:t>data</a:t>
+              <a:t>The data</a:t>
             </a:r>
           </a:p>
         </p:txBody>
@@ -5322,56 +4696,48 @@
           <a:p>
             <a:pPr lvl="1"/>
             <a:r>
-              <a:rPr/>
               <a:t>We use the Critical Care Health Informatics Collaborative dataset.</a:t>
             </a:r>
           </a:p>
           <a:p>
             <a:pPr lvl="1"/>
             <a:r>
-              <a:rPr/>
               <a:t>Multicentre adult intensive therapy unit database</a:t>
             </a:r>
           </a:p>
           <a:p>
             <a:pPr lvl="2"/>
             <a:r>
-              <a:rPr/>
               <a:t>11 adult intensive care units</a:t>
             </a:r>
           </a:p>
           <a:p>
             <a:pPr lvl="2"/>
             <a:r>
-              <a:rPr/>
               <a:t>5 UK teaching hospitals</a:t>
             </a:r>
           </a:p>
           <a:p>
             <a:pPr lvl="2"/>
             <a:r>
-              <a:rPr/>
               <a:t>Privacy ensured through “highest standards of data security”</a:t>
             </a:r>
           </a:p>
           <a:p>
             <a:pPr lvl="2"/>
             <a:r>
-              <a:rPr/>
               <a:t>18, 074 unique patients</a:t>
             </a:r>
           </a:p>
           <a:p>
             <a:pPr lvl="1"/>
             <a:r>
-              <a:rPr/>
               <a:t>You will be using a synthetically derived dataset structured in a simillar format to the CCHIC data.</a:t>
             </a:r>
           </a:p>
           <a:p>
             <a:pPr lvl="1"/>
             <a:r>
-              <a:rPr/>
               <a:t>Data looks real, but isn’t.</a:t>
             </a:r>
           </a:p>
@@ -5379,6 +4745,9 @@
       </p:sp>
     </p:spTree>
   </p:cSld>
+  <p:clrMapOvr>
+    <a:masterClrMapping/>
+  </p:clrMapOvr>
 </p:sld>
 </file>
 
@@ -5420,20 +4789,11 @@
           <a:bodyPr/>
           <a:lstStyle/>
           <a:p>
-            <a:pPr lvl="0" marL="0" indent="0">
+            <a:pPr marL="0" lvl="0" indent="0">
               <a:buNone/>
             </a:pPr>
             <a:r>
-              <a:rPr/>
-              <a:t>Workshop</a:t>
-            </a:r>
-            <a:r>
-              <a:rPr/>
-              <a:t> </a:t>
-            </a:r>
-            <a:r>
-              <a:rPr/>
-              <a:t>layout</a:t>
+              <a:t>Workshop layout</a:t>
             </a:r>
           </a:p>
         </p:txBody>
@@ -5461,35 +4821,30 @@
           <a:p>
             <a:pPr lvl="1"/>
             <a:r>
-              <a:rPr/>
               <a:t>8 workshops.</a:t>
             </a:r>
           </a:p>
           <a:p>
             <a:pPr lvl="1"/>
             <a:r>
-              <a:rPr/>
               <a:t>These include presentations and chances for you to follow along on your laptops.</a:t>
             </a:r>
           </a:p>
           <a:p>
             <a:pPr lvl="1"/>
             <a:r>
-              <a:rPr/>
               <a:t>You work your way through a worksheet during Workshop 2.</a:t>
             </a:r>
           </a:p>
           <a:p>
             <a:pPr lvl="1"/>
             <a:r>
-              <a:rPr/>
               <a:t>You try to answer a question of your own using data during Workshop 8.</a:t>
             </a:r>
           </a:p>
           <a:p>
             <a:pPr lvl="1"/>
             <a:r>
-              <a:rPr/>
               <a:t>A pdf file is available on the GitHub: </a:t>
             </a:r>
             <a:r>
@@ -5499,7 +4854,6 @@
               <a:t>https://github.com/datascibc/ClinicianCoders/blob/master/Handout.pdf</a:t>
             </a:r>
             <a:r>
-              <a:rPr/>
               <a:t>. It contains all of the content from the course workshops for future reference.</a:t>
             </a:r>
           </a:p>
@@ -5507,6 +4861,9 @@
       </p:sp>
     </p:spTree>
   </p:cSld>
+  <p:clrMapOvr>
+    <a:masterClrMapping/>
+  </p:clrMapOvr>
 </p:sld>
 </file>
 
@@ -5548,60 +4905,11 @@
           <a:bodyPr/>
           <a:lstStyle/>
           <a:p>
-            <a:pPr lvl="0" marL="0" indent="0">
+            <a:pPr marL="0" lvl="0" indent="0">
               <a:buNone/>
             </a:pPr>
             <a:r>
-              <a:rPr/>
-              <a:t>Final</a:t>
-            </a:r>
-            <a:r>
-              <a:rPr/>
-              <a:t> </a:t>
-            </a:r>
-            <a:r>
-              <a:rPr/>
-              <a:t>note</a:t>
-            </a:r>
-            <a:r>
-              <a:rPr/>
-              <a:t> </a:t>
-            </a:r>
-            <a:r>
-              <a:rPr/>
-              <a:t>-</a:t>
-            </a:r>
-            <a:r>
-              <a:rPr/>
-              <a:t> </a:t>
-            </a:r>
-            <a:r>
-              <a:rPr/>
-              <a:t>tips</a:t>
-            </a:r>
-            <a:r>
-              <a:rPr/>
-              <a:t> </a:t>
-            </a:r>
-            <a:r>
-              <a:rPr/>
-              <a:t>on</a:t>
-            </a:r>
-            <a:r>
-              <a:rPr/>
-              <a:t> </a:t>
-            </a:r>
-            <a:r>
-              <a:rPr/>
-              <a:t>writing</a:t>
-            </a:r>
-            <a:r>
-              <a:rPr/>
-              <a:t> </a:t>
-            </a:r>
-            <a:r>
-              <a:rPr/>
-              <a:t>code</a:t>
+              <a:t>Final note - tips on writing code</a:t>
             </a:r>
           </a:p>
         </p:txBody>
@@ -5629,28 +4937,24 @@
           <a:p>
             <a:pPr lvl="1"/>
             <a:r>
-              <a:rPr/>
               <a:t>Save your work frequently!</a:t>
             </a:r>
           </a:p>
           <a:p>
             <a:pPr lvl="1"/>
             <a:r>
-              <a:rPr/>
               <a:t>It takes a while to get the hang of writing code.</a:t>
             </a:r>
           </a:p>
           <a:p>
             <a:pPr lvl="1"/>
             <a:r>
-              <a:rPr/>
               <a:t>Be mindful as you type code out.</a:t>
             </a:r>
           </a:p>
           <a:p>
             <a:pPr lvl="2"/>
             <a:r>
-              <a:rPr/>
               <a:t>Check your punctuation (e.g. placement of </a:t>
             </a:r>
             <a:r>
@@ -5660,7 +4964,6 @@
               <a:t>()</a:t>
             </a:r>
             <a:r>
-              <a:rPr/>
               <a:t> or </a:t>
             </a:r>
             <a:r>
@@ -5670,14 +4973,12 @@
               <a:t>,</a:t>
             </a:r>
             <a:r>
-              <a:rPr/>
               <a:t>).</a:t>
             </a:r>
           </a:p>
           <a:p>
             <a:pPr lvl="2"/>
             <a:r>
-              <a:rPr/>
               <a:t>Capitalisation matters (e.g. </a:t>
             </a:r>
             <a:r>
@@ -5687,7 +4988,6 @@
               <a:t>Data</a:t>
             </a:r>
             <a:r>
-              <a:rPr/>
               <a:t> vs </a:t>
             </a:r>
             <a:r>
@@ -5697,21 +4997,18 @@
               <a:t>data</a:t>
             </a:r>
             <a:r>
-              <a:rPr/>
               <a:t>).</a:t>
             </a:r>
           </a:p>
           <a:p>
             <a:pPr lvl="1"/>
             <a:r>
-              <a:rPr/>
               <a:t>Google is your friend.</a:t>
             </a:r>
           </a:p>
           <a:p>
             <a:pPr lvl="1"/>
             <a:r>
-              <a:rPr/>
               <a:t>Tell us if you spot any errors we’ve made!</a:t>
             </a:r>
           </a:p>
@@ -5719,6 +5016,9 @@
       </p:sp>
     </p:spTree>
   </p:cSld>
+  <p:clrMapOvr>
+    <a:masterClrMapping/>
+  </p:clrMapOvr>
 </p:sld>
 </file>
 

</xml_diff>

<commit_message>
Update course structure slide 8  WelcomePresentation
</commit_message>
<xml_diff>
--- a/Workshops/WelcomePresentation_inperson.pptx
+++ b/Workshops/WelcomePresentation_inperson.pptx
@@ -4793,6 +4793,7 @@
               <a:buNone/>
             </a:pPr>
             <a:r>
+              <a:rPr dirty="0"/>
               <a:t>Workshop layout</a:t>
             </a:r>
           </a:p>
@@ -4821,39 +4822,45 @@
           <a:p>
             <a:pPr lvl="1"/>
             <a:r>
-              <a:t>8 workshops.</a:t>
+              <a:rPr lang="en-GB" dirty="0"/>
+              <a:t>7 workshops</a:t>
+            </a:r>
+          </a:p>
+          <a:p>
+            <a:pPr lvl="2"/>
+            <a:r>
+              <a:rPr lang="en-GB" dirty="0"/>
+              <a:t>These include presentations and chances for you to follow along on your laptops.</a:t>
+            </a:r>
+          </a:p>
+          <a:p>
+            <a:pPr lvl="2"/>
+            <a:r>
+              <a:rPr lang="en-GB" dirty="0"/>
+              <a:t>Workshop 2: You work your way through a worksheet during.</a:t>
+            </a:r>
+          </a:p>
+          <a:p>
+            <a:pPr lvl="2"/>
+            <a:r>
+              <a:rPr lang="en-GB" dirty="0"/>
+              <a:t>Workshop 7: You try to answer a question of your own using data. We will ask you to submit this question by the end of Day 2.</a:t>
             </a:r>
           </a:p>
           <a:p>
             <a:pPr lvl="1"/>
             <a:r>
-              <a:t>These include presentations and chances for you to follow along on your laptops.</a:t>
-            </a:r>
-          </a:p>
-          <a:p>
-            <a:pPr lvl="1"/>
-            <a:r>
-              <a:t>You work your way through a worksheet during Workshop 2.</a:t>
-            </a:r>
-          </a:p>
-          <a:p>
-            <a:pPr lvl="1"/>
-            <a:r>
-              <a:t>You try to answer a question of your own using data during Workshop 8.</a:t>
-            </a:r>
-          </a:p>
-          <a:p>
-            <a:pPr lvl="1"/>
-            <a:r>
+              <a:rPr lang="en-GB" dirty="0"/>
               <a:t>A pdf file is available on the GitHub: </a:t>
             </a:r>
             <a:r>
-              <a:rPr>
+              <a:rPr lang="en-GB" dirty="0">
                 <a:hlinkClick r:id="rId2"/>
               </a:rPr>
-              <a:t>https://github.com/datascibc/ClinicianCoders/blob/master/Handout.pdf</a:t>
-            </a:r>
-            <a:r>
+              <a:t>https://github.com/ClinicianCoders/ClinicianCoders/blob/master/Handout.pdf</a:t>
+            </a:r>
+            <a:r>
+              <a:rPr lang="en-GB" dirty="0"/>
               <a:t>. It contains all of the content from the course workshops for future reference.</a:t>
             </a:r>
           </a:p>

</xml_diff>

<commit_message>
Repaired pptx template bullet point level issue
</commit_message>
<xml_diff>
--- a/Workshops/WelcomePresentation_inperson.pptx
+++ b/Workshops/WelcomePresentation_inperson.pptx
@@ -1,6 +1,6 @@
 
 <file path=ppt/presentation.xml><?xml version="1.0" encoding="utf-8"?>
-<p:presentation xmlns:a="http://schemas.openxmlformats.org/drawingml/2006/main" xmlns:r="http://schemas.openxmlformats.org/officeDocument/2006/relationships" xmlns:p="http://schemas.openxmlformats.org/presentationml/2006/main" saveSubsetFonts="1" autoCompressPictures="0">
+<p:presentation xmlns:a="http://schemas.openxmlformats.org/drawingml/2006/main" xmlns:p="http://schemas.openxmlformats.org/presentationml/2006/main" xmlns:r="http://schemas.openxmlformats.org/officeDocument/2006/relationships" autoCompressPictures="0" saveSubsetFonts="1">
   <p:sldMasterIdLst>
     <p:sldMasterId id="2147483648" r:id="rId1"/>
   </p:sldMasterIdLst>
@@ -25,8 +25,8 @@
     <a:defPPr>
       <a:defRPr lang="en-US"/>
     </a:defPPr>
-    <a:lvl1pPr marL="0" algn="l" defTabSz="914400" rtl="0" eaLnBrk="1" latinLnBrk="0" hangingPunct="1">
-      <a:defRPr sz="1800" kern="1200">
+    <a:lvl1pPr algn="l" defTabSz="914400" eaLnBrk="1" hangingPunct="1" latinLnBrk="0" marL="0" rtl="0">
+      <a:defRPr kern="1200" sz="1800">
         <a:solidFill>
           <a:schemeClr val="tx1"/>
         </a:solidFill>
@@ -35,8 +35,8 @@
         <a:cs typeface="+mn-cs"/>
       </a:defRPr>
     </a:lvl1pPr>
-    <a:lvl2pPr marL="457200" algn="l" defTabSz="914400" rtl="0" eaLnBrk="1" latinLnBrk="0" hangingPunct="1">
-      <a:defRPr sz="1800" kern="1200">
+    <a:lvl2pPr algn="l" defTabSz="914400" eaLnBrk="1" hangingPunct="1" latinLnBrk="0" marL="457200" rtl="0">
+      <a:defRPr kern="1200" sz="1800">
         <a:solidFill>
           <a:schemeClr val="tx1"/>
         </a:solidFill>
@@ -45,8 +45,8 @@
         <a:cs typeface="+mn-cs"/>
       </a:defRPr>
     </a:lvl2pPr>
-    <a:lvl3pPr marL="914400" algn="l" defTabSz="914400" rtl="0" eaLnBrk="1" latinLnBrk="0" hangingPunct="1">
-      <a:defRPr sz="1800" kern="1200">
+    <a:lvl3pPr algn="l" defTabSz="914400" eaLnBrk="1" hangingPunct="1" latinLnBrk="0" marL="914400" rtl="0">
+      <a:defRPr kern="1200" sz="1800">
         <a:solidFill>
           <a:schemeClr val="tx1"/>
         </a:solidFill>
@@ -55,8 +55,8 @@
         <a:cs typeface="+mn-cs"/>
       </a:defRPr>
     </a:lvl3pPr>
-    <a:lvl4pPr marL="1371600" algn="l" defTabSz="914400" rtl="0" eaLnBrk="1" latinLnBrk="0" hangingPunct="1">
-      <a:defRPr sz="1800" kern="1200">
+    <a:lvl4pPr algn="l" defTabSz="914400" eaLnBrk="1" hangingPunct="1" latinLnBrk="0" marL="1371600" rtl="0">
+      <a:defRPr kern="1200" sz="1800">
         <a:solidFill>
           <a:schemeClr val="tx1"/>
         </a:solidFill>
@@ -65,8 +65,8 @@
         <a:cs typeface="+mn-cs"/>
       </a:defRPr>
     </a:lvl4pPr>
-    <a:lvl5pPr marL="1828800" algn="l" defTabSz="914400" rtl="0" eaLnBrk="1" latinLnBrk="0" hangingPunct="1">
-      <a:defRPr sz="1800" kern="1200">
+    <a:lvl5pPr algn="l" defTabSz="914400" eaLnBrk="1" hangingPunct="1" latinLnBrk="0" marL="1828800" rtl="0">
+      <a:defRPr kern="1200" sz="1800">
         <a:solidFill>
           <a:schemeClr val="tx1"/>
         </a:solidFill>
@@ -75,8 +75,8 @@
         <a:cs typeface="+mn-cs"/>
       </a:defRPr>
     </a:lvl5pPr>
-    <a:lvl6pPr marL="2286000" algn="l" defTabSz="914400" rtl="0" eaLnBrk="1" latinLnBrk="0" hangingPunct="1">
-      <a:defRPr sz="1800" kern="1200">
+    <a:lvl6pPr algn="l" defTabSz="914400" eaLnBrk="1" hangingPunct="1" latinLnBrk="0" marL="2286000" rtl="0">
+      <a:defRPr kern="1200" sz="1800">
         <a:solidFill>
           <a:schemeClr val="tx1"/>
         </a:solidFill>
@@ -85,8 +85,8 @@
         <a:cs typeface="+mn-cs"/>
       </a:defRPr>
     </a:lvl6pPr>
-    <a:lvl7pPr marL="2743200" algn="l" defTabSz="914400" rtl="0" eaLnBrk="1" latinLnBrk="0" hangingPunct="1">
-      <a:defRPr sz="1800" kern="1200">
+    <a:lvl7pPr algn="l" defTabSz="914400" eaLnBrk="1" hangingPunct="1" latinLnBrk="0" marL="2743200" rtl="0">
+      <a:defRPr kern="1200" sz="1800">
         <a:solidFill>
           <a:schemeClr val="tx1"/>
         </a:solidFill>
@@ -95,8 +95,8 @@
         <a:cs typeface="+mn-cs"/>
       </a:defRPr>
     </a:lvl7pPr>
-    <a:lvl8pPr marL="3200400" algn="l" defTabSz="914400" rtl="0" eaLnBrk="1" latinLnBrk="0" hangingPunct="1">
-      <a:defRPr sz="1800" kern="1200">
+    <a:lvl8pPr algn="l" defTabSz="914400" eaLnBrk="1" hangingPunct="1" latinLnBrk="0" marL="3200400" rtl="0">
+      <a:defRPr kern="1200" sz="1800">
         <a:solidFill>
           <a:schemeClr val="tx1"/>
         </a:solidFill>
@@ -105,8 +105,8 @@
         <a:cs typeface="+mn-cs"/>
       </a:defRPr>
     </a:lvl8pPr>
-    <a:lvl9pPr marL="3657600" algn="l" defTabSz="914400" rtl="0" eaLnBrk="1" latinLnBrk="0" hangingPunct="1">
-      <a:defRPr sz="1800" kern="1200">
+    <a:lvl9pPr algn="l" defTabSz="914400" eaLnBrk="1" hangingPunct="1" latinLnBrk="0" marL="3657600" rtl="0">
+      <a:defRPr kern="1200" sz="1800">
         <a:solidFill>
           <a:schemeClr val="tx1"/>
         </a:solidFill>
@@ -206,7 +206,7 @@
           <a:p>
             <a:fld id="{0F9C1CCF-B725-44A7-AA57-5E433BD85C9F}" type="datetimeFigureOut">
               <a:rPr lang="en-US" smtClean="0"/>
-              <a:t>10/9/22</a:t>
+              <a:t>1/2/22</a:t>
             </a:fld>
             <a:endParaRPr lang="en-US"/>
           </a:p>
@@ -517,10 +517,11 @@
           <a:bodyPr/>
           <a:lstStyle/>
           <a:p>
-            <a:pPr marL="0" lvl="0" indent="0">
+            <a:pPr lvl="0" indent="0" marL="0">
               <a:buNone/>
             </a:pPr>
             <a:r>
+              <a:rPr/>
               <a:t>Say that this is a quick intro to the course. And that this is what we cover during this intro.</a:t>
             </a:r>
           </a:p>
@@ -551,9 +552,6 @@
       </p:sp>
     </p:spTree>
   </p:cSld>
-  <p:clrMapOvr>
-    <a:masterClrMapping/>
-  </p:clrMapOvr>
 </p:notes>
 </file>
 
@@ -601,10 +599,11 @@
           <a:bodyPr/>
           <a:lstStyle/>
           <a:p>
-            <a:pPr marL="0" lvl="0" indent="0">
+            <a:pPr lvl="0" indent="0" marL="0">
               <a:buNone/>
             </a:pPr>
             <a:r>
+              <a:rPr/>
               <a:t>Go through each item on list, make sure each person has completed all items. You can spend some time on this slide. Tell people that they can sign the CCHIC user sharing agreement if they want to access the full public dataset to play with later.</a:t>
             </a:r>
           </a:p>
@@ -635,9 +634,6 @@
       </p:sp>
     </p:spTree>
   </p:cSld>
-  <p:clrMapOvr>
-    <a:masterClrMapping/>
-  </p:clrMapOvr>
 </p:notes>
 </file>
 
@@ -685,10 +681,11 @@
           <a:bodyPr/>
           <a:lstStyle/>
           <a:p>
-            <a:pPr marL="0" lvl="0" indent="0">
+            <a:pPr lvl="0" indent="0" marL="0">
               <a:buNone/>
             </a:pPr>
             <a:r>
+              <a:rPr/>
               <a:t>Lunch is provided</a:t>
             </a:r>
           </a:p>
@@ -719,9 +716,6 @@
       </p:sp>
     </p:spTree>
   </p:cSld>
-  <p:clrMapOvr>
-    <a:masterClrMapping/>
-  </p:clrMapOvr>
 </p:notes>
 </file>
 
@@ -872,7 +866,7 @@
           <a:p>
             <a:fld id="{937E6D32-4C03-264D-8FDB-034DA7582E3B}" type="datetimeFigureOut">
               <a:rPr lang="en-US" smtClean="0"/>
-              <a:t>10/9/22</a:t>
+              <a:t>10/9/2022</a:t>
             </a:fld>
             <a:endParaRPr lang="en-US"/>
           </a:p>
@@ -1070,7 +1064,7 @@
           <a:p>
             <a:fld id="{937E6D32-4C03-264D-8FDB-034DA7582E3B}" type="datetimeFigureOut">
               <a:rPr lang="en-US" smtClean="0"/>
-              <a:t>10/9/22</a:t>
+              <a:t>10/9/2022</a:t>
             </a:fld>
             <a:endParaRPr lang="en-US"/>
           </a:p>
@@ -1278,7 +1272,7 @@
           <a:p>
             <a:fld id="{937E6D32-4C03-264D-8FDB-034DA7582E3B}" type="datetimeFigureOut">
               <a:rPr lang="en-US" smtClean="0"/>
-              <a:t>10/9/22</a:t>
+              <a:t>10/9/2022</a:t>
             </a:fld>
             <a:endParaRPr lang="en-US"/>
           </a:p>
@@ -1476,7 +1470,7 @@
           <a:p>
             <a:fld id="{937E6D32-4C03-264D-8FDB-034DA7582E3B}" type="datetimeFigureOut">
               <a:rPr lang="en-US" smtClean="0"/>
-              <a:t>10/9/22</a:t>
+              <a:t>10/9/2022</a:t>
             </a:fld>
             <a:endParaRPr lang="en-US"/>
           </a:p>
@@ -1751,7 +1745,7 @@
           <a:p>
             <a:fld id="{937E6D32-4C03-264D-8FDB-034DA7582E3B}" type="datetimeFigureOut">
               <a:rPr lang="en-US" smtClean="0"/>
-              <a:t>10/9/22</a:t>
+              <a:t>10/9/2022</a:t>
             </a:fld>
             <a:endParaRPr lang="en-US"/>
           </a:p>
@@ -2016,7 +2010,7 @@
           <a:p>
             <a:fld id="{937E6D32-4C03-264D-8FDB-034DA7582E3B}" type="datetimeFigureOut">
               <a:rPr lang="en-US" smtClean="0"/>
-              <a:t>10/9/22</a:t>
+              <a:t>10/9/2022</a:t>
             </a:fld>
             <a:endParaRPr lang="en-US"/>
           </a:p>
@@ -2428,7 +2422,7 @@
           <a:p>
             <a:fld id="{937E6D32-4C03-264D-8FDB-034DA7582E3B}" type="datetimeFigureOut">
               <a:rPr lang="en-US" smtClean="0"/>
-              <a:t>10/9/22</a:t>
+              <a:t>10/9/2022</a:t>
             </a:fld>
             <a:endParaRPr lang="en-US"/>
           </a:p>
@@ -2569,7 +2563,7 @@
           <a:p>
             <a:fld id="{937E6D32-4C03-264D-8FDB-034DA7582E3B}" type="datetimeFigureOut">
               <a:rPr lang="en-US" smtClean="0"/>
-              <a:t>10/9/22</a:t>
+              <a:t>10/9/2022</a:t>
             </a:fld>
             <a:endParaRPr lang="en-US"/>
           </a:p>
@@ -2682,7 +2676,7 @@
           <a:p>
             <a:fld id="{937E6D32-4C03-264D-8FDB-034DA7582E3B}" type="datetimeFigureOut">
               <a:rPr lang="en-US" smtClean="0"/>
-              <a:t>10/9/22</a:t>
+              <a:t>10/9/2022</a:t>
             </a:fld>
             <a:endParaRPr lang="en-US"/>
           </a:p>
@@ -2993,7 +2987,7 @@
           <a:p>
             <a:fld id="{937E6D32-4C03-264D-8FDB-034DA7582E3B}" type="datetimeFigureOut">
               <a:rPr lang="en-US" smtClean="0"/>
-              <a:t>10/9/22</a:t>
+              <a:t>10/9/2022</a:t>
             </a:fld>
             <a:endParaRPr lang="en-US"/>
           </a:p>
@@ -3281,7 +3275,7 @@
           <a:p>
             <a:fld id="{937E6D32-4C03-264D-8FDB-034DA7582E3B}" type="datetimeFigureOut">
               <a:rPr lang="en-US" smtClean="0"/>
-              <a:t>10/9/22</a:t>
+              <a:t>10/9/2022</a:t>
             </a:fld>
             <a:endParaRPr lang="en-US"/>
           </a:p>
@@ -3355,7 +3349,7 @@
 </file>
 
 <file path=ppt/slideMasters/slideMaster1.xml><?xml version="1.0" encoding="utf-8"?>
-<p:sldMaster xmlns:a="http://schemas.openxmlformats.org/drawingml/2006/main" xmlns:r="http://schemas.openxmlformats.org/officeDocument/2006/relationships" xmlns:p="http://schemas.openxmlformats.org/presentationml/2006/main">
+<p:sldMaster xmlns:a="http://schemas.openxmlformats.org/drawingml/2006/main" xmlns:p="http://schemas.openxmlformats.org/presentationml/2006/main" xmlns:r="http://schemas.openxmlformats.org/officeDocument/2006/relationships">
   <p:cSld>
     <p:bg>
       <p:bgRef idx="1001">
@@ -3402,7 +3396,7 @@
           </a:prstGeom>
         </p:spPr>
         <p:txBody>
-          <a:bodyPr vert="horz" lIns="91440" tIns="45720" rIns="91440" bIns="45720" rtlCol="0" anchor="ctr">
+          <a:bodyPr anchor="ctr" bIns="45720" lIns="91440" rIns="91440" rtlCol="0" tIns="45720" vert="horz">
             <a:normAutofit/>
           </a:bodyPr>
           <a:lstStyle/>
@@ -3427,7 +3421,7 @@
             <a:spLocks noGrp="1"/>
           </p:cNvSpPr>
           <p:nvPr>
-            <p:ph type="body" idx="1"/>
+            <p:ph idx="1" type="body"/>
           </p:nvPr>
         </p:nvSpPr>
         <p:spPr>
@@ -3440,42 +3434,42 @@
           </a:prstGeom>
         </p:spPr>
         <p:txBody>
-          <a:bodyPr vert="horz" lIns="91440" tIns="45720" rIns="91440" bIns="45720" rtlCol="0">
+          <a:bodyPr bIns="45720" lIns="91440" rIns="91440" rtlCol="0" tIns="45720" vert="horz">
             <a:normAutofit/>
           </a:bodyPr>
           <a:lstStyle/>
           <a:p>
             <a:pPr lvl="0"/>
             <a:r>
-              <a:rPr lang="en-US" dirty="0"/>
+              <a:rPr dirty="0" lang="en-US"/>
               <a:t>Click to edit Master text styles</a:t>
             </a:r>
           </a:p>
           <a:p>
             <a:pPr lvl="1"/>
             <a:r>
-              <a:rPr lang="en-US" dirty="0"/>
+              <a:rPr dirty="0" lang="en-US"/>
               <a:t>Second level</a:t>
             </a:r>
           </a:p>
           <a:p>
             <a:pPr lvl="2"/>
             <a:r>
-              <a:rPr lang="en-US" dirty="0"/>
+              <a:rPr dirty="0" lang="en-US"/>
               <a:t>Third level</a:t>
             </a:r>
           </a:p>
           <a:p>
             <a:pPr lvl="3"/>
             <a:r>
-              <a:rPr lang="en-US" dirty="0"/>
+              <a:rPr dirty="0" lang="en-US"/>
               <a:t>Fourth level</a:t>
             </a:r>
           </a:p>
           <a:p>
             <a:pPr lvl="4"/>
             <a:r>
-              <a:rPr lang="en-US" dirty="0"/>
+              <a:rPr dirty="0" lang="en-US"/>
               <a:t>Fifth level</a:t>
             </a:r>
           </a:p>
@@ -3494,7 +3488,7 @@
             <a:spLocks noGrp="1"/>
           </p:cNvSpPr>
           <p:nvPr>
-            <p:ph type="dt" sz="half" idx="2"/>
+            <p:ph idx="2" sz="half" type="dt"/>
           </p:nvPr>
         </p:nvSpPr>
         <p:spPr>
@@ -3507,7 +3501,7 @@
           </a:prstGeom>
         </p:spPr>
         <p:txBody>
-          <a:bodyPr vert="horz" lIns="91440" tIns="45720" rIns="91440" bIns="45720" rtlCol="0" anchor="ctr"/>
+          <a:bodyPr anchor="ctr" bIns="45720" lIns="91440" rIns="91440" rtlCol="0" tIns="45720" vert="horz"/>
           <a:lstStyle>
             <a:lvl1pPr algn="l">
               <a:defRPr sz="1200">
@@ -3522,7 +3516,7 @@
           <a:p>
             <a:fld id="{937E6D32-4C03-264D-8FDB-034DA7582E3B}" type="datetimeFigureOut">
               <a:rPr lang="en-US" smtClean="0"/>
-              <a:t>10/9/22</a:t>
+              <a:t>10/9/2022</a:t>
             </a:fld>
             <a:endParaRPr lang="en-US"/>
           </a:p>
@@ -3541,7 +3535,7 @@
             <a:spLocks noGrp="1"/>
           </p:cNvSpPr>
           <p:nvPr>
-            <p:ph type="ftr" sz="quarter" idx="3"/>
+            <p:ph idx="3" sz="quarter" type="ftr"/>
           </p:nvPr>
         </p:nvSpPr>
         <p:spPr>
@@ -3554,7 +3548,7 @@
           </a:prstGeom>
         </p:spPr>
         <p:txBody>
-          <a:bodyPr vert="horz" lIns="91440" tIns="45720" rIns="91440" bIns="45720" rtlCol="0" anchor="ctr"/>
+          <a:bodyPr anchor="ctr" bIns="45720" lIns="91440" rIns="91440" rtlCol="0" tIns="45720" vert="horz"/>
           <a:lstStyle>
             <a:lvl1pPr algn="ctr">
               <a:defRPr sz="1200">
@@ -3584,7 +3578,7 @@
             <a:spLocks noGrp="1"/>
           </p:cNvSpPr>
           <p:nvPr>
-            <p:ph type="sldNum" sz="quarter" idx="4"/>
+            <p:ph idx="4" sz="quarter" type="sldNum"/>
           </p:nvPr>
         </p:nvSpPr>
         <p:spPr>
@@ -3597,7 +3591,7 @@
           </a:prstGeom>
         </p:spPr>
         <p:txBody>
-          <a:bodyPr vert="horz" lIns="91440" tIns="45720" rIns="91440" bIns="45720" rtlCol="0" anchor="ctr"/>
+          <a:bodyPr anchor="ctr" bIns="45720" lIns="91440" rIns="91440" rtlCol="0" tIns="45720" vert="horz"/>
           <a:lstStyle>
             <a:lvl1pPr algn="r">
               <a:defRPr sz="1200">
@@ -3625,7 +3619,7 @@
       </p:ext>
     </p:extLst>
   </p:cSld>
-  <p:clrMap bg1="lt1" tx1="dk1" bg2="lt2" tx2="dk2" accent1="accent1" accent2="accent2" accent3="accent3" accent4="accent4" accent5="accent5" accent6="accent6" hlink="hlink" folHlink="folHlink"/>
+  <p:clrMap accent1="accent1" accent2="accent2" accent3="accent3" accent4="accent4" accent5="accent5" accent6="accent6" bg1="lt1" bg2="lt2" folHlink="folHlink" hlink="hlink" tx1="dk1" tx2="dk2"/>
   <p:sldLayoutIdLst>
     <p:sldLayoutId id="2147483649" r:id="rId1"/>
     <p:sldLayoutId id="2147483650" r:id="rId2"/>
@@ -3641,7 +3635,7 @@
   </p:sldLayoutIdLst>
   <p:txStyles>
     <p:titleStyle>
-      <a:lvl1pPr algn="l" defTabSz="914400" rtl="0" eaLnBrk="1" latinLnBrk="0" hangingPunct="1">
+      <a:lvl1pPr algn="l" defTabSz="914400" eaLnBrk="1" hangingPunct="1" latinLnBrk="0" rtl="0">
         <a:lnSpc>
           <a:spcPct val="90000"/>
         </a:lnSpc>
@@ -3649,7 +3643,7 @@
           <a:spcPct val="0"/>
         </a:spcBef>
         <a:buNone/>
-        <a:defRPr sz="4400" kern="1200">
+        <a:defRPr kern="1200" sz="4400">
           <a:solidFill>
             <a:schemeClr val="tx1"/>
           </a:solidFill>
@@ -3660,16 +3654,16 @@
       </a:lvl1pPr>
     </p:titleStyle>
     <p:bodyStyle>
-      <a:lvl1pPr marL="1144800" indent="-228600" algn="l" defTabSz="914400" rtl="0" eaLnBrk="1" latinLnBrk="0" hangingPunct="1">
+      <a:lvl1pPr algn="l" defTabSz="914400" eaLnBrk="1" hangingPunct="1" indent="-228600" latinLnBrk="0" marL="230400" rtl="0">
         <a:lnSpc>
           <a:spcPct val="90000"/>
         </a:lnSpc>
         <a:spcBef>
-          <a:spcPts val="1000"/>
+          <a:spcPts val="500"/>
         </a:spcBef>
-        <a:buFont typeface="Arial" panose="020B0604020202020204" pitchFamily="34" charset="0"/>
+        <a:buFont charset="0" panose="020B0604020202020204" pitchFamily="34" typeface="Arial"/>
         <a:buChar char="•"/>
-        <a:defRPr sz="1800" kern="1200">
+        <a:defRPr kern="1200" sz="2000">
           <a:solidFill>
             <a:schemeClr val="tx1"/>
           </a:solidFill>
@@ -3678,16 +3672,16 @@
           <a:cs typeface="+mn-cs"/>
         </a:defRPr>
       </a:lvl1pPr>
-      <a:lvl2pPr marL="685800" indent="-228600" algn="l" defTabSz="914400" rtl="0" eaLnBrk="1" latinLnBrk="0" hangingPunct="1">
+      <a:lvl2pPr algn="l" defTabSz="914400" eaLnBrk="1" hangingPunct="1" indent="-228600" latinLnBrk="0" marL="685800" rtl="0">
         <a:lnSpc>
           <a:spcPct val="90000"/>
         </a:lnSpc>
         <a:spcBef>
           <a:spcPts val="500"/>
         </a:spcBef>
-        <a:buFont typeface="Arial" panose="020B0604020202020204" pitchFamily="34" charset="0"/>
+        <a:buFont charset="0" panose="020B0604020202020204" pitchFamily="34" typeface="Arial"/>
         <a:buChar char="•"/>
-        <a:defRPr sz="2300" kern="1200">
+        <a:defRPr kern="1200" sz="1800">
           <a:solidFill>
             <a:schemeClr val="tx1"/>
           </a:solidFill>
@@ -3696,16 +3690,16 @@
           <a:cs typeface="+mn-cs"/>
         </a:defRPr>
       </a:lvl2pPr>
-      <a:lvl3pPr marL="1143000" indent="-228600" algn="l" defTabSz="914400" rtl="0" eaLnBrk="1" latinLnBrk="0" hangingPunct="1">
+      <a:lvl3pPr algn="l" defTabSz="914400" eaLnBrk="1" hangingPunct="1" indent="-228600" latinLnBrk="0" marL="1143000" rtl="0">
         <a:lnSpc>
           <a:spcPct val="90000"/>
         </a:lnSpc>
         <a:spcBef>
           <a:spcPts val="500"/>
         </a:spcBef>
-        <a:buFont typeface="Arial" panose="020B0604020202020204" pitchFamily="34" charset="0"/>
+        <a:buFont charset="0" panose="020B0604020202020204" pitchFamily="34" typeface="Arial"/>
         <a:buChar char="•"/>
-        <a:defRPr sz="2000" kern="1200">
+        <a:defRPr kern="1200" sz="1800">
           <a:solidFill>
             <a:schemeClr val="tx1"/>
           </a:solidFill>
@@ -3714,16 +3708,16 @@
           <a:cs typeface="+mn-cs"/>
         </a:defRPr>
       </a:lvl3pPr>
-      <a:lvl4pPr marL="1600200" indent="-228600" algn="l" defTabSz="914400" rtl="0" eaLnBrk="1" latinLnBrk="0" hangingPunct="1">
+      <a:lvl4pPr algn="l" defTabSz="914400" eaLnBrk="1" hangingPunct="1" indent="-228600" latinLnBrk="0" marL="1600200" rtl="0">
         <a:lnSpc>
           <a:spcPct val="90000"/>
         </a:lnSpc>
         <a:spcBef>
           <a:spcPts val="500"/>
         </a:spcBef>
-        <a:buFont typeface="Arial" panose="020B0604020202020204" pitchFamily="34" charset="0"/>
+        <a:buFont charset="0" panose="020B0604020202020204" pitchFamily="34" typeface="Arial"/>
         <a:buChar char="•"/>
-        <a:defRPr sz="1800" kern="1200">
+        <a:defRPr kern="1200" sz="1600">
           <a:solidFill>
             <a:schemeClr val="tx1"/>
           </a:solidFill>
@@ -3732,16 +3726,16 @@
           <a:cs typeface="+mn-cs"/>
         </a:defRPr>
       </a:lvl4pPr>
-      <a:lvl5pPr marL="2057400" indent="-228600" algn="l" defTabSz="914400" rtl="0" eaLnBrk="1" latinLnBrk="0" hangingPunct="1">
+      <a:lvl5pPr algn="l" defTabSz="914400" eaLnBrk="1" hangingPunct="1" indent="-228600" latinLnBrk="0" marL="2057400" rtl="0">
         <a:lnSpc>
           <a:spcPct val="90000"/>
         </a:lnSpc>
         <a:spcBef>
           <a:spcPts val="500"/>
         </a:spcBef>
-        <a:buFont typeface="Arial" panose="020B0604020202020204" pitchFamily="34" charset="0"/>
+        <a:buFont charset="0" panose="020B0604020202020204" pitchFamily="34" typeface="Arial"/>
         <a:buChar char="•"/>
-        <a:defRPr sz="1800" kern="1200">
+        <a:defRPr kern="1200" sz="1600">
           <a:solidFill>
             <a:schemeClr val="tx1"/>
           </a:solidFill>
@@ -3750,16 +3744,16 @@
           <a:cs typeface="+mn-cs"/>
         </a:defRPr>
       </a:lvl5pPr>
-      <a:lvl6pPr marL="2514600" indent="-228600" algn="l" defTabSz="914400" rtl="0" eaLnBrk="1" latinLnBrk="0" hangingPunct="1">
+      <a:lvl6pPr algn="l" defTabSz="914400" eaLnBrk="1" hangingPunct="1" indent="-228600" latinLnBrk="0" marL="2514600" rtl="0">
         <a:lnSpc>
           <a:spcPct val="90000"/>
         </a:lnSpc>
         <a:spcBef>
           <a:spcPts val="500"/>
         </a:spcBef>
-        <a:buFont typeface="Arial" panose="020B0604020202020204" pitchFamily="34" charset="0"/>
+        <a:buFont charset="0" panose="020B0604020202020204" pitchFamily="34" typeface="Arial"/>
         <a:buChar char="•"/>
-        <a:defRPr sz="1800" kern="1200">
+        <a:defRPr kern="1200" sz="1800">
           <a:solidFill>
             <a:schemeClr val="tx1"/>
           </a:solidFill>
@@ -3768,16 +3762,16 @@
           <a:cs typeface="+mn-cs"/>
         </a:defRPr>
       </a:lvl6pPr>
-      <a:lvl7pPr marL="2971800" indent="-228600" algn="l" defTabSz="914400" rtl="0" eaLnBrk="1" latinLnBrk="0" hangingPunct="1">
+      <a:lvl7pPr algn="l" defTabSz="914400" eaLnBrk="1" hangingPunct="1" indent="-228600" latinLnBrk="0" marL="2971800" rtl="0">
         <a:lnSpc>
           <a:spcPct val="90000"/>
         </a:lnSpc>
         <a:spcBef>
           <a:spcPts val="500"/>
         </a:spcBef>
-        <a:buFont typeface="Arial" panose="020B0604020202020204" pitchFamily="34" charset="0"/>
+        <a:buFont charset="0" panose="020B0604020202020204" pitchFamily="34" typeface="Arial"/>
         <a:buChar char="•"/>
-        <a:defRPr sz="1800" kern="1200">
+        <a:defRPr kern="1200" sz="1800">
           <a:solidFill>
             <a:schemeClr val="tx1"/>
           </a:solidFill>
@@ -3786,16 +3780,16 @@
           <a:cs typeface="+mn-cs"/>
         </a:defRPr>
       </a:lvl7pPr>
-      <a:lvl8pPr marL="3429000" indent="-228600" algn="l" defTabSz="914400" rtl="0" eaLnBrk="1" latinLnBrk="0" hangingPunct="1">
+      <a:lvl8pPr algn="l" defTabSz="914400" eaLnBrk="1" hangingPunct="1" indent="-228600" latinLnBrk="0" marL="3429000" rtl="0">
         <a:lnSpc>
           <a:spcPct val="90000"/>
         </a:lnSpc>
         <a:spcBef>
           <a:spcPts val="500"/>
         </a:spcBef>
-        <a:buFont typeface="Arial" panose="020B0604020202020204" pitchFamily="34" charset="0"/>
+        <a:buFont charset="0" panose="020B0604020202020204" pitchFamily="34" typeface="Arial"/>
         <a:buChar char="•"/>
-        <a:defRPr sz="1800" kern="1200">
+        <a:defRPr kern="1200" sz="1800">
           <a:solidFill>
             <a:schemeClr val="tx1"/>
           </a:solidFill>
@@ -3804,16 +3798,16 @@
           <a:cs typeface="+mn-cs"/>
         </a:defRPr>
       </a:lvl8pPr>
-      <a:lvl9pPr marL="3886200" indent="-228600" algn="l" defTabSz="914400" rtl="0" eaLnBrk="1" latinLnBrk="0" hangingPunct="1">
+      <a:lvl9pPr algn="l" defTabSz="914400" eaLnBrk="1" hangingPunct="1" indent="-228600" latinLnBrk="0" marL="3886200" rtl="0">
         <a:lnSpc>
           <a:spcPct val="90000"/>
         </a:lnSpc>
         <a:spcBef>
           <a:spcPts val="500"/>
         </a:spcBef>
-        <a:buFont typeface="Arial" panose="020B0604020202020204" pitchFamily="34" charset="0"/>
+        <a:buFont charset="0" panose="020B0604020202020204" pitchFamily="34" typeface="Arial"/>
         <a:buChar char="•"/>
-        <a:defRPr sz="1800" kern="1200">
+        <a:defRPr kern="1200" sz="1800">
           <a:solidFill>
             <a:schemeClr val="tx1"/>
           </a:solidFill>
@@ -3827,8 +3821,8 @@
       <a:defPPr>
         <a:defRPr lang="en-US"/>
       </a:defPPr>
-      <a:lvl1pPr marL="0" algn="l" defTabSz="914400" rtl="0" eaLnBrk="1" latinLnBrk="0" hangingPunct="1">
-        <a:defRPr sz="1800" kern="1200">
+      <a:lvl1pPr algn="l" defTabSz="914400" eaLnBrk="1" hangingPunct="1" latinLnBrk="0" marL="0" rtl="0">
+        <a:defRPr kern="1200" sz="1800">
           <a:solidFill>
             <a:schemeClr val="tx1"/>
           </a:solidFill>
@@ -3837,8 +3831,8 @@
           <a:cs typeface="+mn-cs"/>
         </a:defRPr>
       </a:lvl1pPr>
-      <a:lvl2pPr marL="457200" algn="l" defTabSz="914400" rtl="0" eaLnBrk="1" latinLnBrk="0" hangingPunct="1">
-        <a:defRPr sz="1800" kern="1200">
+      <a:lvl2pPr algn="l" defTabSz="914400" eaLnBrk="1" hangingPunct="1" latinLnBrk="0" marL="457200" rtl="0">
+        <a:defRPr kern="1200" sz="1800">
           <a:solidFill>
             <a:schemeClr val="tx1"/>
           </a:solidFill>
@@ -3847,8 +3841,8 @@
           <a:cs typeface="+mn-cs"/>
         </a:defRPr>
       </a:lvl2pPr>
-      <a:lvl3pPr marL="914400" algn="l" defTabSz="914400" rtl="0" eaLnBrk="1" latinLnBrk="0" hangingPunct="1">
-        <a:defRPr sz="1800" kern="1200">
+      <a:lvl3pPr algn="l" defTabSz="914400" eaLnBrk="1" hangingPunct="1" latinLnBrk="0" marL="914400" rtl="0">
+        <a:defRPr kern="1200" sz="1800">
           <a:solidFill>
             <a:schemeClr val="tx1"/>
           </a:solidFill>
@@ -3857,8 +3851,8 @@
           <a:cs typeface="+mn-cs"/>
         </a:defRPr>
       </a:lvl3pPr>
-      <a:lvl4pPr marL="1371600" algn="l" defTabSz="914400" rtl="0" eaLnBrk="1" latinLnBrk="0" hangingPunct="1">
-        <a:defRPr sz="1800" kern="1200">
+      <a:lvl4pPr algn="l" defTabSz="914400" eaLnBrk="1" hangingPunct="1" latinLnBrk="0" marL="1371600" rtl="0">
+        <a:defRPr kern="1200" sz="1800">
           <a:solidFill>
             <a:schemeClr val="tx1"/>
           </a:solidFill>
@@ -3867,8 +3861,8 @@
           <a:cs typeface="+mn-cs"/>
         </a:defRPr>
       </a:lvl4pPr>
-      <a:lvl5pPr marL="1828800" algn="l" defTabSz="914400" rtl="0" eaLnBrk="1" latinLnBrk="0" hangingPunct="1">
-        <a:defRPr sz="1800" kern="1200">
+      <a:lvl5pPr algn="l" defTabSz="914400" eaLnBrk="1" hangingPunct="1" latinLnBrk="0" marL="1828800" rtl="0">
+        <a:defRPr kern="1200" sz="1800">
           <a:solidFill>
             <a:schemeClr val="tx1"/>
           </a:solidFill>
@@ -3877,8 +3871,8 @@
           <a:cs typeface="+mn-cs"/>
         </a:defRPr>
       </a:lvl5pPr>
-      <a:lvl6pPr marL="2286000" algn="l" defTabSz="914400" rtl="0" eaLnBrk="1" latinLnBrk="0" hangingPunct="1">
-        <a:defRPr sz="1800" kern="1200">
+      <a:lvl6pPr algn="l" defTabSz="914400" eaLnBrk="1" hangingPunct="1" latinLnBrk="0" marL="2286000" rtl="0">
+        <a:defRPr kern="1200" sz="1800">
           <a:solidFill>
             <a:schemeClr val="tx1"/>
           </a:solidFill>
@@ -3887,8 +3881,8 @@
           <a:cs typeface="+mn-cs"/>
         </a:defRPr>
       </a:lvl6pPr>
-      <a:lvl7pPr marL="2743200" algn="l" defTabSz="914400" rtl="0" eaLnBrk="1" latinLnBrk="0" hangingPunct="1">
-        <a:defRPr sz="1800" kern="1200">
+      <a:lvl7pPr algn="l" defTabSz="914400" eaLnBrk="1" hangingPunct="1" latinLnBrk="0" marL="2743200" rtl="0">
+        <a:defRPr kern="1200" sz="1800">
           <a:solidFill>
             <a:schemeClr val="tx1"/>
           </a:solidFill>
@@ -3897,8 +3891,8 @@
           <a:cs typeface="+mn-cs"/>
         </a:defRPr>
       </a:lvl7pPr>
-      <a:lvl8pPr marL="3200400" algn="l" defTabSz="914400" rtl="0" eaLnBrk="1" latinLnBrk="0" hangingPunct="1">
-        <a:defRPr sz="1800" kern="1200">
+      <a:lvl8pPr algn="l" defTabSz="914400" eaLnBrk="1" hangingPunct="1" latinLnBrk="0" marL="3200400" rtl="0">
+        <a:defRPr kern="1200" sz="1800">
           <a:solidFill>
             <a:schemeClr val="tx1"/>
           </a:solidFill>
@@ -3907,8 +3901,8 @@
           <a:cs typeface="+mn-cs"/>
         </a:defRPr>
       </a:lvl8pPr>
-      <a:lvl9pPr marL="3657600" algn="l" defTabSz="914400" rtl="0" eaLnBrk="1" latinLnBrk="0" hangingPunct="1">
-        <a:defRPr sz="1800" kern="1200">
+      <a:lvl9pPr algn="l" defTabSz="914400" eaLnBrk="1" hangingPunct="1" latinLnBrk="0" marL="3657600" rtl="0">
+        <a:defRPr kern="1200" sz="1800">
           <a:solidFill>
             <a:schemeClr val="tx1"/>
           </a:solidFill>
@@ -3965,10 +3959,11 @@
           <a:bodyPr/>
           <a:lstStyle/>
           <a:p>
-            <a:pPr marL="0" lvl="0" indent="0">
+            <a:pPr lvl="0" indent="0" marL="0">
               <a:buNone/>
             </a:pPr>
             <a:r>
+              <a:rPr/>
               <a:t>Welcome to Clinician Coders</a:t>
             </a:r>
           </a:p>
@@ -3987,7 +3982,7 @@
             <a:spLocks noGrp="1"/>
           </p:cNvSpPr>
           <p:nvPr>
-            <p:ph type="subTitle" idx="1"/>
+            <p:ph idx="1" type="subTitle"/>
           </p:nvPr>
         </p:nvSpPr>
         <p:spPr>
@@ -4000,20 +3995,16 @@
           <a:bodyPr/>
           <a:lstStyle/>
           <a:p>
-            <a:pPr marL="0" lvl="0" indent="0">
+            <a:pPr lvl="0" indent="0" marL="0">
               <a:buNone/>
             </a:pPr>
             <a:br/>
             <a:br/>
-            <a:endParaRPr/>
           </a:p>
         </p:txBody>
       </p:sp>
     </p:spTree>
   </p:cSld>
-  <p:clrMapOvr>
-    <a:masterClrMapping/>
-  </p:clrMapOvr>
 </p:sld>
 </file>
 
@@ -4060,7 +4051,7 @@
           <a:bodyPr/>
           <a:lstStyle/>
           <a:p>
-            <a:pPr marL="0" lvl="0" indent="0">
+            <a:pPr lvl="0" indent="0" marL="0">
               <a:buNone/>
             </a:pPr>
             <a:r>
@@ -4072,9 +4063,6 @@
       </p:sp>
     </p:spTree>
   </p:cSld>
-  <p:clrMapOvr>
-    <a:masterClrMapping/>
-  </p:clrMapOvr>
 </p:sld>
 </file>
 
@@ -4097,7 +4085,7 @@
       </p:grpSpPr>
       <p:pic>
         <p:nvPicPr>
-          <p:cNvPr id="2" name="Picture 1" descr="../Images/ClinicianCodersBranding_FINAL_CMYK_Colour.png"/>
+          <p:cNvPr descr="../Images/ClinicianCodersBranding_FINAL_CMYK_Colour.png" id="0" name="Picture 1"/>
           <p:cNvPicPr>
             <a:picLocks noGrp="1" noChangeAspect="1"/>
           </p:cNvPicPr>
@@ -4127,9 +4115,6 @@
       </p:pic>
     </p:spTree>
   </p:cSld>
-  <p:clrMapOvr>
-    <a:masterClrMapping/>
-  </p:clrMapOvr>
 </p:sld>
 </file>
 
@@ -4171,10 +4156,11 @@
           <a:bodyPr/>
           <a:lstStyle/>
           <a:p>
-            <a:pPr marL="0" lvl="0" indent="0">
+            <a:pPr lvl="0" indent="0" marL="0">
               <a:buNone/>
             </a:pPr>
             <a:r>
+              <a:rPr/>
               <a:t>Hello!</a:t>
             </a:r>
           </a:p>
@@ -4203,30 +4189,35 @@
           <a:p>
             <a:pPr lvl="0"/>
             <a:r>
+              <a:rPr/>
               <a:t>Pre-requisites</a:t>
             </a:r>
           </a:p>
           <a:p>
             <a:pPr lvl="0"/>
             <a:r>
+              <a:rPr/>
               <a:t>Course schedule</a:t>
             </a:r>
           </a:p>
           <a:p>
             <a:pPr lvl="0"/>
             <a:r>
+              <a:rPr/>
               <a:t>What to expect from the workshops</a:t>
             </a:r>
           </a:p>
           <a:p>
             <a:pPr lvl="1"/>
             <a:r>
+              <a:rPr/>
               <a:t>Data</a:t>
             </a:r>
           </a:p>
           <a:p>
             <a:pPr lvl="1"/>
             <a:r>
+              <a:rPr/>
               <a:t>Layout</a:t>
             </a:r>
           </a:p>
@@ -4234,9 +4225,6 @@
       </p:sp>
     </p:spTree>
   </p:cSld>
-  <p:clrMapOvr>
-    <a:masterClrMapping/>
-  </p:clrMapOvr>
 </p:sld>
 </file>
 
@@ -4278,10 +4266,11 @@
           <a:bodyPr/>
           <a:lstStyle/>
           <a:p>
-            <a:pPr marL="0" lvl="0" indent="0">
+            <a:pPr lvl="0" indent="0" marL="0">
               <a:buNone/>
             </a:pPr>
             <a:r>
+              <a:rPr/>
               <a:t>Pre-requisites</a:t>
             </a:r>
           </a:p>
@@ -4310,36 +4299,42 @@
           <a:p>
             <a:pPr lvl="0"/>
             <a:r>
+              <a:rPr/>
               <a:t>Charging facilities – where’s your nearest?</a:t>
             </a:r>
           </a:p>
           <a:p>
             <a:pPr lvl="0"/>
             <a:r>
+              <a:rPr/>
               <a:t>Access Wi-fi</a:t>
             </a:r>
           </a:p>
           <a:p>
             <a:pPr lvl="0"/>
             <a:r>
+              <a:rPr/>
               <a:t>Download R Studio</a:t>
             </a:r>
           </a:p>
           <a:p>
             <a:pPr lvl="0"/>
             <a:r>
+              <a:rPr/>
               <a:t>Have a spreadsheet program on your laptop</a:t>
             </a:r>
           </a:p>
           <a:p>
             <a:pPr lvl="0"/>
             <a:r>
+              <a:rPr/>
               <a:t>Join the Slack channel</a:t>
             </a:r>
           </a:p>
           <a:p>
             <a:pPr lvl="0"/>
             <a:r>
+              <a:rPr/>
               <a:t>Decide which dataset to use on the second day</a:t>
             </a:r>
           </a:p>
@@ -4347,9 +4342,6 @@
       </p:sp>
     </p:spTree>
   </p:cSld>
-  <p:clrMapOvr>
-    <a:masterClrMapping/>
-  </p:clrMapOvr>
 </p:sld>
 </file>
 
@@ -4391,10 +4383,11 @@
           <a:bodyPr/>
           <a:lstStyle/>
           <a:p>
-            <a:pPr marL="0" lvl="0" indent="0">
+            <a:pPr lvl="0" indent="0" marL="0">
               <a:buNone/>
             </a:pPr>
             <a:r>
+              <a:rPr/>
               <a:t>Schedule - Day 1</a:t>
             </a:r>
           </a:p>
@@ -4423,42 +4416,49 @@
           <a:p>
             <a:pPr lvl="0"/>
             <a:r>
+              <a:rPr/>
               <a:t>09:30 - 11:00: Workshop 1: Introduction to R</a:t>
             </a:r>
           </a:p>
           <a:p>
             <a:pPr lvl="0"/>
             <a:r>
+              <a:rPr/>
               <a:t>11:00 - 11:15: Coffee Break</a:t>
             </a:r>
           </a:p>
           <a:p>
             <a:pPr lvl="0"/>
             <a:r>
+              <a:rPr/>
               <a:t>11:15 - 12:00: Workshop 2: Cleaning your Dataset</a:t>
             </a:r>
           </a:p>
           <a:p>
             <a:pPr lvl="0"/>
             <a:r>
+              <a:rPr/>
               <a:t>12:00 - 13:00: Lunch break</a:t>
             </a:r>
           </a:p>
           <a:p>
             <a:pPr lvl="0"/>
             <a:r>
+              <a:rPr/>
               <a:t>13:00 - 14:15: Workshop 3: Getting your Data into R</a:t>
             </a:r>
           </a:p>
           <a:p>
             <a:pPr lvl="0"/>
             <a:r>
+              <a:rPr/>
               <a:t>14:15 - 14:30: Coffee Break</a:t>
             </a:r>
           </a:p>
           <a:p>
             <a:pPr lvl="0"/>
             <a:r>
+              <a:rPr/>
               <a:t>14:30 - 16:30: Workshop 4: Data Wrangling</a:t>
             </a:r>
           </a:p>
@@ -4466,9 +4466,6 @@
       </p:sp>
     </p:spTree>
   </p:cSld>
-  <p:clrMapOvr>
-    <a:masterClrMapping/>
-  </p:clrMapOvr>
 </p:sld>
 </file>
 
@@ -4510,10 +4507,11 @@
           <a:bodyPr/>
           <a:lstStyle/>
           <a:p>
-            <a:pPr marL="0" lvl="0" indent="0">
+            <a:pPr lvl="0" indent="0" marL="0">
               <a:buNone/>
             </a:pPr>
             <a:r>
+              <a:rPr/>
               <a:t>Schedule - Day 2</a:t>
             </a:r>
           </a:p>
@@ -4542,42 +4540,49 @@
           <a:p>
             <a:pPr lvl="0"/>
             <a:r>
+              <a:rPr/>
               <a:t>09:00 - 10:30: Workshop 5: Data visualisation</a:t>
             </a:r>
           </a:p>
           <a:p>
             <a:pPr lvl="0"/>
             <a:r>
+              <a:rPr/>
               <a:t>10:30 - 10:45: Coffee break</a:t>
             </a:r>
           </a:p>
           <a:p>
             <a:pPr lvl="0"/>
             <a:r>
+              <a:rPr/>
               <a:t>10:45 - 12:00: Workshop 6: Control flow and looping (part 1)</a:t>
             </a:r>
           </a:p>
           <a:p>
             <a:pPr lvl="0"/>
             <a:r>
+              <a:rPr/>
               <a:t>12:00 - 13:00: Lunch break</a:t>
             </a:r>
           </a:p>
           <a:p>
             <a:pPr lvl="0"/>
             <a:r>
+              <a:rPr/>
               <a:t>13:00 - 13:45: Workshop 6: Control flow and looping (part 2)</a:t>
             </a:r>
           </a:p>
           <a:p>
             <a:pPr lvl="0"/>
             <a:r>
+              <a:rPr/>
               <a:t>13:45 - 14:00: Coffee break</a:t>
             </a:r>
           </a:p>
           <a:p>
             <a:pPr lvl="0"/>
             <a:r>
+              <a:rPr/>
               <a:t>14:00 - 16:00: Workshop 7: Using your own data</a:t>
             </a:r>
           </a:p>
@@ -4585,9 +4590,6 @@
       </p:sp>
     </p:spTree>
   </p:cSld>
-  <p:clrMapOvr>
-    <a:masterClrMapping/>
-  </p:clrMapOvr>
 </p:sld>
 </file>
 
@@ -4629,10 +4631,11 @@
           <a:bodyPr/>
           <a:lstStyle/>
           <a:p>
-            <a:pPr marL="0" lvl="0" indent="0">
+            <a:pPr lvl="0" indent="0" marL="0">
               <a:buNone/>
             </a:pPr>
             <a:r>
+              <a:rPr/>
               <a:t>The data</a:t>
             </a:r>
           </a:p>
@@ -4661,50 +4664,56 @@
           <a:p>
             <a:pPr lvl="0"/>
             <a:r>
+              <a:rPr/>
               <a:t>We use the Critical Care Health Informatics Collaborative dataset</a:t>
             </a:r>
           </a:p>
           <a:p>
+            <a:pPr lvl="1"/>
+            <a:r>
+              <a:rPr/>
+              <a:t>Multicentre adult intensive therapy unit database</a:t>
+            </a:r>
+          </a:p>
+          <a:p>
+            <a:pPr lvl="1"/>
+            <a:r>
+              <a:rPr/>
+              <a:t>11 adult intensive care units</a:t>
+            </a:r>
+          </a:p>
+          <a:p>
+            <a:pPr lvl="1"/>
+            <a:r>
+              <a:rPr/>
+              <a:t>5 UK teaching hospitals</a:t>
+            </a:r>
+          </a:p>
+          <a:p>
+            <a:pPr lvl="1"/>
+            <a:r>
+              <a:rPr/>
+              <a:t>Privacy ensured through “highest standards of data security”</a:t>
+            </a:r>
+          </a:p>
+          <a:p>
+            <a:pPr lvl="1"/>
+            <a:r>
+              <a:rPr/>
+              <a:t>18, 074 unique patients</a:t>
+            </a:r>
+          </a:p>
+          <a:p>
             <a:pPr lvl="0"/>
             <a:r>
-              <a:t>Multicentre adult intensive therapy unit database</a:t>
-            </a:r>
-            <a:br/>
-            <a:endParaRPr/>
+              <a:rPr/>
+              <a:t>You will be using a synthetically derived dataset structured in a simillar format to the CCHIC data.</a:t>
+            </a:r>
           </a:p>
           <a:p>
             <a:pPr lvl="0"/>
             <a:r>
-              <a:t>11 adult intensive care units</a:t>
-            </a:r>
-          </a:p>
-          <a:p>
-            <a:pPr lvl="0"/>
-            <a:r>
-              <a:t>5 UK teaching hospitals</a:t>
-            </a:r>
-          </a:p>
-          <a:p>
-            <a:pPr lvl="0"/>
-            <a:r>
-              <a:t>Privacy ensured through “highest standards of data security”</a:t>
-            </a:r>
-          </a:p>
-          <a:p>
-            <a:pPr lvl="0"/>
-            <a:r>
-              <a:t>18, 074 unique patients</a:t>
-            </a:r>
-          </a:p>
-          <a:p>
-            <a:pPr lvl="0"/>
-            <a:r>
-              <a:t>You will be using a synthetically derived dataset structured in a simillar format to the CCHIC data.</a:t>
-            </a:r>
-          </a:p>
-          <a:p>
-            <a:pPr lvl="0"/>
-            <a:r>
+              <a:rPr/>
               <a:t>Data looks real, but isn’t.</a:t>
             </a:r>
           </a:p>
@@ -4712,9 +4721,6 @@
       </p:sp>
     </p:spTree>
   </p:cSld>
-  <p:clrMapOvr>
-    <a:masterClrMapping/>
-  </p:clrMapOvr>
 </p:sld>
 </file>
 
@@ -4756,10 +4762,11 @@
           <a:bodyPr/>
           <a:lstStyle/>
           <a:p>
-            <a:pPr marL="0" lvl="0" indent="0">
+            <a:pPr lvl="0" indent="0" marL="0">
               <a:buNone/>
             </a:pPr>
             <a:r>
+              <a:rPr/>
               <a:t>Workshop layout</a:t>
             </a:r>
           </a:p>
@@ -4788,30 +4795,35 @@
           <a:p>
             <a:pPr lvl="0"/>
             <a:r>
+              <a:rPr/>
               <a:t>7 workshops</a:t>
             </a:r>
           </a:p>
           <a:p>
+            <a:pPr lvl="1"/>
+            <a:r>
+              <a:rPr/>
+              <a:t>These include presentations and chances for you to follow along on your laptops.</a:t>
+            </a:r>
+          </a:p>
+          <a:p>
+            <a:pPr lvl="1"/>
+            <a:r>
+              <a:rPr/>
+              <a:t>Workshop 2: You work your way through a worksheet during .</a:t>
+            </a:r>
+          </a:p>
+          <a:p>
+            <a:pPr lvl="1"/>
+            <a:r>
+              <a:rPr/>
+              <a:t>Workshop 7: You try to answer a question of your own using data. We will ask you to submit this question by the end of Day 2.</a:t>
+            </a:r>
+          </a:p>
+          <a:p>
             <a:pPr lvl="0"/>
             <a:r>
-              <a:t>These include presentations and chances for you to follow along on your laptops.</a:t>
-            </a:r>
-          </a:p>
-          <a:p>
-            <a:pPr lvl="0"/>
-            <a:r>
-              <a:t>Workshop 2: You work your way through a worksheet during .</a:t>
-            </a:r>
-          </a:p>
-          <a:p>
-            <a:pPr lvl="0"/>
-            <a:r>
-              <a:t>Workshop 7: You try to answer a question of your own using data. We will ask you to submit this question by the end of Day 2.</a:t>
-            </a:r>
-          </a:p>
-          <a:p>
-            <a:pPr lvl="0"/>
-            <a:r>
+              <a:rPr/>
               <a:t>A pdf file is available on the GitHub: </a:t>
             </a:r>
             <a:r>
@@ -4821,6 +4833,7 @@
               <a:t>https://github.com/ClinicianCoders/ClinicianCoders/blob/master/Handout.pdf</a:t>
             </a:r>
             <a:r>
+              <a:rPr/>
               <a:t>. It contains all of the content from the course workshops for future reference.</a:t>
             </a:r>
           </a:p>
@@ -4828,9 +4841,6 @@
       </p:sp>
     </p:spTree>
   </p:cSld>
-  <p:clrMapOvr>
-    <a:masterClrMapping/>
-  </p:clrMapOvr>
 </p:sld>
 </file>
 
@@ -4872,10 +4882,11 @@
           <a:bodyPr/>
           <a:lstStyle/>
           <a:p>
-            <a:pPr marL="0" lvl="0" indent="0">
+            <a:pPr lvl="0" indent="0" marL="0">
               <a:buNone/>
             </a:pPr>
             <a:r>
+              <a:rPr/>
               <a:t>Final note - tips on writing code</a:t>
             </a:r>
           </a:p>
@@ -4904,24 +4915,28 @@
           <a:p>
             <a:pPr lvl="0"/>
             <a:r>
+              <a:rPr/>
               <a:t>Save your work frequently!</a:t>
             </a:r>
           </a:p>
           <a:p>
             <a:pPr lvl="0"/>
             <a:r>
+              <a:rPr/>
               <a:t>It takes a while to get the hang of writing code.</a:t>
             </a:r>
           </a:p>
           <a:p>
             <a:pPr lvl="0"/>
             <a:r>
+              <a:rPr/>
               <a:t>Be mindful as you type code out.</a:t>
             </a:r>
           </a:p>
           <a:p>
             <a:pPr lvl="1"/>
             <a:r>
+              <a:rPr/>
               <a:t>Check your punctuation (e.g. placement of </a:t>
             </a:r>
             <a:r>
@@ -4931,6 +4946,7 @@
               <a:t>()</a:t>
             </a:r>
             <a:r>
+              <a:rPr/>
               <a:t> or </a:t>
             </a:r>
             <a:r>
@@ -4940,12 +4956,14 @@
               <a:t>,</a:t>
             </a:r>
             <a:r>
+              <a:rPr/>
               <a:t>).</a:t>
             </a:r>
           </a:p>
           <a:p>
             <a:pPr lvl="1"/>
             <a:r>
+              <a:rPr/>
               <a:t>Capitalisation matters (e.g. </a:t>
             </a:r>
             <a:r>
@@ -4955,6 +4973,7 @@
               <a:t>Data</a:t>
             </a:r>
             <a:r>
+              <a:rPr/>
               <a:t> vs </a:t>
             </a:r>
             <a:r>
@@ -4964,18 +4983,21 @@
               <a:t>data</a:t>
             </a:r>
             <a:r>
+              <a:rPr/>
               <a:t>).</a:t>
             </a:r>
           </a:p>
           <a:p>
             <a:pPr lvl="0"/>
             <a:r>
+              <a:rPr/>
               <a:t>Google is your friend.</a:t>
             </a:r>
           </a:p>
           <a:p>
             <a:pPr lvl="0"/>
             <a:r>
+              <a:rPr/>
               <a:t>Tell us if you spot any errors we’ve made!</a:t>
             </a:r>
           </a:p>
@@ -4983,9 +5005,6 @@
       </p:sp>
     </p:spTree>
   </p:cSld>
-  <p:clrMapOvr>
-    <a:masterClrMapping/>
-  </p:clrMapOvr>
 </p:sld>
 </file>
 

</xml_diff>